<commit_message>
work on pptx format opening, modyfing and savin first slide of raport template (text changes)
</commit_message>
<xml_diff>
--- a/Resources/toStream2.pptx
+++ b/Resources/toStream2.pptx
@@ -1257,7 +1257,7 @@
           <a:bodyPr/>
           <a:lstStyle/>
           <a:p>
-            <a:fld id="{CE833795-4CE4-4787-8C8C-734BDF49B61F}" type="slidenum">
+            <a:fld id="{1AD25AE8-1460-4069-81AA-CCAA3242E434}" type="slidenum">
               <a:rPr lang="en-US" smtClean="0"/>
               <a:t>1</a:t>
             </a:fld>
@@ -1340,7 +1340,7 @@
           <a:bodyPr/>
           <a:lstStyle/>
           <a:p>
-            <a:fld id="{C8310376-3D78-4DE3-9DC3-3D2DF5272B4A}" type="slidenum">
+            <a:fld id="{50BDADAB-957B-4AC0-BA4E-E2FAC64D6586}" type="slidenum">
               <a:rPr lang="en-US" smtClean="0"/>
               <a:t>2</a:t>
             </a:fld>
@@ -1423,7 +1423,7 @@
           <a:bodyPr/>
           <a:lstStyle/>
           <a:p>
-            <a:fld id="{2D9F234C-8FFD-4E2D-87BB-09E6187487FD}" type="slidenum">
+            <a:fld id="{F6D8335F-A837-4B9E-A747-4BE4951BDAB0}" type="slidenum">
               <a:rPr lang="en-US" smtClean="0"/>
               <a:t>3</a:t>
             </a:fld>
@@ -1506,7 +1506,7 @@
           <a:bodyPr/>
           <a:lstStyle/>
           <a:p>
-            <a:fld id="{12F974CF-208E-4847-8EDB-CED0BFA4E192}" type="slidenum">
+            <a:fld id="{5D6D8B16-0C8E-421F-A682-2020B106FE4D}" type="slidenum">
               <a:rPr lang="en-US" smtClean="0"/>
               <a:t>4</a:t>
             </a:fld>
@@ -1589,7 +1589,7 @@
           <a:bodyPr/>
           <a:lstStyle/>
           <a:p>
-            <a:fld id="{35182879-A7BE-4891-96ED-922A5341E01D}" type="slidenum">
+            <a:fld id="{0FF2575D-E16E-4632-A5CC-B90AC13206E5}" type="slidenum">
               <a:rPr lang="en-US" smtClean="0">
                 <a:solidFill>
                   <a:prstClr val="black"/>
@@ -1747,7 +1747,7 @@
           <a:bodyPr/>
           <a:lstStyle/>
           <a:p>
-            <a:fld id="{968CA3D7-DA43-4BD6-9945-0A46C41092A6}" type="slidenum">
+            <a:fld id="{7809756E-C8C6-4724-8C5E-632A1C42DB81}" type="slidenum">
               <a:rPr lang="en-US" smtClean="0"/>
               <a:t>7</a:t>
             </a:fld>
@@ -1827,7 +1827,7 @@
           <a:bodyPr/>
           <a:lstStyle/>
           <a:p>
-            <a:fld id="{7FD54918-C8EC-411D-9FC2-10D56CC194F6}" type="slidenum">
+            <a:fld id="{88257075-A088-4324-BD88-080F5713BB38}" type="slidenum">
               <a:rPr lang="en-US" smtClean="0"/>
               <a:t>8</a:t>
             </a:fld>
@@ -1974,7 +1974,7 @@
           <a:bodyPr/>
           <a:lstStyle/>
           <a:p>
-            <a:fld id="{573FB6CA-C28C-4DFB-99C0-AEB9B5B2EA2F}" type="slidenum">
+            <a:fld id="{1BC97E1A-4E0D-4822-8532-C7E0CCE926A3}" type="slidenum">
               <a:rPr lang="en-US" smtClean="0"/>
               <a:t>10</a:t>
             </a:fld>
@@ -2057,7 +2057,7 @@
           <a:bodyPr/>
           <a:lstStyle/>
           <a:p>
-            <a:fld id="{B83F4FA3-8834-4B6B-B855-E4C9206FF988}" type="slidenum">
+            <a:fld id="{CD8F9B28-18EC-4A5E-ADE5-F68A61C9E3D2}" type="slidenum">
               <a:rPr lang="en-US" smtClean="0"/>
               <a:t>11</a:t>
             </a:fld>
@@ -2142,7 +2142,7 @@
           <a:bodyPr/>
           <a:lstStyle/>
           <a:p>
-            <a:fld id="{17C169B2-9415-4B1C-BD68-248D97CFF327}" type="slidenum">
+            <a:fld id="{747E987C-F94D-45B7-B7A0-E87D49841C54}" type="slidenum">
               <a:rPr lang="en-US" smtClean="0"/>
               <a:t>12</a:t>
             </a:fld>
@@ -2191,7 +2191,7 @@
           <a:bodyPr/>
           <a:lstStyle/>
           <a:p>
-            <a:fld id="{A8AC01D8-CC8C-4644-A3A4-5A1847454486}" type="slidenum">
+            <a:fld id="{5491597C-A650-4285-8844-E8BC3999725F}" type="slidenum">
               <a:rPr lang="en-US" smtClean="0"/>
               <a:t>13</a:t>
             </a:fld>
@@ -2307,7 +2307,7 @@
           <a:bodyPr/>
           <a:lstStyle/>
           <a:p>
-            <a:fld id="{564C6D95-420C-4AC9-A250-4E9E725CE3F7}" type="slidenum">
+            <a:fld id="{396F6D35-F4E5-4F1D-A36B-73DA92F00B8E}" type="slidenum">
               <a:rPr lang="en-US" smtClean="0"/>
               <a:t>14</a:t>
             </a:fld>
@@ -2361,7 +2361,7 @@
           <a:bodyPr/>
           <a:lstStyle/>
           <a:p>
-            <a:fld id="{535192A5-4030-4577-9295-57A3E95310DB}" type="slidenum">
+            <a:fld id="{A36AA310-5226-4A68-BBEE-B9662CB91911}" type="slidenum">
               <a:rPr lang="en-US" smtClean="0">
                 <a:solidFill>
                   <a:prstClr val="black"/>
@@ -2490,7 +2490,7 @@
           <a:bodyPr/>
           <a:lstStyle/>
           <a:p>
-            <a:fld id="{C92B55CF-9962-4815-B694-BDE1D8AD7EA3}" type="slidenum">
+            <a:fld id="{7BFA96AF-1F4C-4D0D-A8DF-AD8D5FA349DE}" type="slidenum">
               <a:rPr lang="en-US" smtClean="0"/>
               <a:t>16</a:t>
             </a:fld>
@@ -2573,7 +2573,7 @@
           <a:bodyPr/>
           <a:lstStyle/>
           <a:p>
-            <a:fld id="{AC42E634-562F-48A7-9357-8F93B513EDE4}" type="slidenum">
+            <a:fld id="{8769EDA4-53E4-44DE-B5EE-7285EDE1308C}" type="slidenum">
               <a:rPr lang="en-US" smtClean="0"/>
               <a:t>17</a:t>
             </a:fld>
@@ -2656,7 +2656,7 @@
           <a:bodyPr/>
           <a:lstStyle/>
           <a:p>
-            <a:fld id="{8EE4E256-24AC-46CF-95F7-0A11186BCE9F}" type="slidenum">
+            <a:fld id="{FB02A687-9E08-45ED-93CA-B9D212B72FF0}" type="slidenum">
               <a:rPr lang="en-US" smtClean="0"/>
               <a:t>18</a:t>
             </a:fld>
@@ -2739,7 +2739,7 @@
           <a:bodyPr/>
           <a:lstStyle/>
           <a:p>
-            <a:fld id="{940831FC-82FF-49E8-B697-FFCCFFC7F318}" type="slidenum">
+            <a:fld id="{B32A40A0-8C88-4DAA-A996-0D44265D5553}" type="slidenum">
               <a:rPr lang="en-US" smtClean="0"/>
               <a:t>19</a:t>
             </a:fld>
@@ -2822,7 +2822,7 @@
           <a:bodyPr/>
           <a:lstStyle/>
           <a:p>
-            <a:fld id="{C1AED468-0CF9-4401-B86F-31B2AC14D886}" type="slidenum">
+            <a:fld id="{CDCDEB09-4C6C-4EE0-B61C-450638CAEA9D}" type="slidenum">
               <a:rPr lang="en-US" smtClean="0"/>
               <a:t>20</a:t>
             </a:fld>
@@ -2905,7 +2905,7 @@
           <a:bodyPr/>
           <a:lstStyle/>
           <a:p>
-            <a:fld id="{1084183E-7B01-471C-9747-2B908CAB8AED}" type="slidenum">
+            <a:fld id="{13242324-407E-4797-938B-B0391599FE85}" type="slidenum">
               <a:rPr lang="en-US" smtClean="0"/>
               <a:t>21</a:t>
             </a:fld>
@@ -8216,7 +8216,7 @@
           <a:lstStyle/>
           <a:p>
             <a:pPr algn="ctr"/>
-            <a:fld id="{C663285D-4C07-47FB-9B37-E2BF3EC3BD04}" type="slidenum">
+            <a:fld id="{458BBF61-5C0D-446D-AD7A-3607F7712EC6}" type="slidenum">
               <a:rPr lang="en-US" smtClean="0"/>
               <a:t>10</a:t>
             </a:fld>
@@ -8991,7 +8991,7 @@
           <a:lstStyle/>
           <a:p>
             <a:pPr algn="ctr"/>
-            <a:fld id="{D748A81C-67BA-4792-B520-C59054BC9C6F}" type="slidenum">
+            <a:fld id="{1003CA62-E335-4B65-90EB-3F9596E69A82}" type="slidenum">
               <a:rPr lang="en-US" smtClean="0"/>
               <a:t>11</a:t>
             </a:fld>
@@ -9736,7 +9736,7 @@
           <a:lstStyle/>
           <a:p>
             <a:pPr algn="ctr"/>
-            <a:fld id="{D06DCA4C-C44B-404E-94A3-4A1680C21A8F}" type="slidenum">
+            <a:fld id="{65FA3D24-AD6B-4BE8-A8FF-86C139CAF4A7}" type="slidenum">
               <a:rPr lang="en-US" smtClean="0"/>
               <a:t>12</a:t>
             </a:fld>
@@ -10568,7 +10568,7 @@
           <a:lstStyle/>
           <a:p>
             <a:pPr algn="ctr"/>
-            <a:fld id="{AC777C15-5735-49B1-A664-4B1D7743EA3E}" type="slidenum">
+            <a:fld id="{47C5BBD0-79C2-4C5A-A6D5-CF7CB40BB445}" type="slidenum">
               <a:rPr lang="en-US" smtClean="0"/>
               <a:t>13</a:t>
             </a:fld>
@@ -11343,7 +11343,7 @@
           <a:lstStyle/>
           <a:p>
             <a:pPr algn="ctr"/>
-            <a:fld id="{19DBBF69-4591-44C9-AAD4-BF3F37536C53}" type="slidenum">
+            <a:fld id="{5EF3744D-32B1-4BDB-A0AF-95B5A5D6B9E3}" type="slidenum">
               <a:rPr lang="en-US" smtClean="0"/>
               <a:t>14</a:t>
             </a:fld>
@@ -12091,7 +12091,7 @@
           <a:lstStyle/>
           <a:p>
             <a:pPr algn="ctr"/>
-            <a:fld id="{32878692-1B48-4623-B8C8-50660534F249}" type="slidenum">
+            <a:fld id="{A780F8F2-C2CF-4011-B5C9-FDFB7CA3A380}" type="slidenum">
               <a:rPr lang="en-US" smtClean="0">
                 <a:solidFill>
                   <a:prstClr val="white"/>
@@ -14818,7 +14818,7 @@
           <a:lstStyle/>
           <a:p>
             <a:pPr algn="ctr"/>
-            <a:fld id="{A4348716-27A9-4FD7-A44E-F294856A8DE5}" type="slidenum">
+            <a:fld id="{06F385DF-ED21-49F5-BDD5-B227D310BD42}" type="slidenum">
               <a:rPr lang="en-US" smtClean="0">
                 <a:solidFill>
                   <a:prstClr val="white"/>
@@ -15574,7 +15574,7 @@
           <a:bodyPr/>
           <a:lstStyle/>
           <a:p>
-            <a:fld id="{DB5F4D8E-DCC4-4644-A62A-19BB8808CF7D}" type="slidenum">
+            <a:fld id="{5B8917D1-DD90-423B-B98A-0CBB22A47A6A}" type="slidenum">
               <a:rPr lang="en-US" smtClean="0"/>
               <a:t>17</a:t>
             </a:fld>
@@ -16035,7 +16035,7 @@
           <a:bodyPr/>
           <a:lstStyle/>
           <a:p>
-            <a:fld id="{86B33A1B-8246-45EB-B980-D4172E327EB6}" type="slidenum">
+            <a:fld id="{17C13019-E558-43D5-A4E8-94208002A878}" type="slidenum">
               <a:rPr lang="en-US" smtClean="0"/>
               <a:t>18</a:t>
             </a:fld>
@@ -18086,7 +18086,7 @@
           <a:lstStyle/>
           <a:p>
             <a:pPr algn="ctr"/>
-            <a:fld id="{82F58C29-BA66-4817-8D60-396CE36A0FFB}" type="slidenum">
+            <a:fld id="{8B732EB3-DE57-4B31-9D8C-AC93EFE515C3}" type="slidenum">
               <a:rPr lang="en-US" smtClean="0">
                 <a:solidFill>
                   <a:prstClr val="white"/>
@@ -20251,7 +20251,7 @@
           <a:bodyPr/>
           <a:lstStyle/>
           <a:p>
-            <a:fld id="{327E9732-914E-461E-8474-A3CB86B566C3}" type="slidenum">
+            <a:fld id="{3129DD4D-E1DC-425A-9D98-7C3D431A59A5}" type="slidenum">
               <a:rPr lang="en-US" smtClean="0"/>
               <a:t>2</a:t>
             </a:fld>
@@ -20385,7 +20385,7 @@
           <a:lstStyle/>
           <a:p>
             <a:pPr algn="ctr"/>
-            <a:fld id="{B16BC808-4551-4F87-B64E-8FA1B7A4CD95}" type="slidenum">
+            <a:fld id="{51C18138-BC7F-4F2B-8D77-E8ED9B49AF6C}" type="slidenum">
               <a:rPr lang="en-US" smtClean="0"/>
               <a:t>20</a:t>
             </a:fld>
@@ -21775,7 +21775,7 @@
           <a:lstStyle/>
           <a:p>
             <a:pPr algn="ctr"/>
-            <a:fld id="{1590D01E-C459-42D4-9DAD-2482DD90A894}" type="slidenum">
+            <a:fld id="{2776E37D-316E-46EC-9374-C9C89F4F25CE}" type="slidenum">
               <a:rPr lang="en-US" smtClean="0"/>
               <a:t>21</a:t>
             </a:fld>
@@ -23111,7 +23111,7 @@
           <a:bodyPr/>
           <a:lstStyle/>
           <a:p>
-            <a:fld id="{3FAB5F35-C112-4F96-B41A-CC4C2539F9A6}" type="slidenum">
+            <a:fld id="{D1F6C239-9482-4E46-AE87-9846A6305DF1}" type="slidenum">
               <a:rPr lang="en-US" smtClean="0"/>
               <a:t>22</a:t>
             </a:fld>
@@ -24341,7 +24341,7 @@
           <a:lstStyle/>
           <a:p>
             <a:pPr algn="ctr"/>
-            <a:fld id="{5F596D37-52DE-4512-9512-303A2FB5D1A8}" type="slidenum">
+            <a:fld id="{0C2F8510-EC9F-4BB5-B074-26ECC62F5674}" type="slidenum">
               <a:rPr lang="en-US" smtClean="0"/>
               <a:t>23</a:t>
             </a:fld>
@@ -25524,7 +25524,7 @@
           <a:lstStyle/>
           <a:p>
             <a:pPr algn="ctr"/>
-            <a:fld id="{111A1DB1-037F-4DD0-8F2E-EF9C5E46F301}" type="slidenum">
+            <a:fld id="{E6ACEF59-2214-46C7-8601-383EB039A2B3}" type="slidenum">
               <a:rPr lang="en-US" smtClean="0"/>
               <a:t>25</a:t>
             </a:fld>
@@ -26214,7 +26214,7 @@
           <a:bodyPr/>
           <a:lstStyle/>
           <a:p>
-            <a:fld id="{BD1E72A6-21D1-4CCF-9A75-A8B7761C8169}" type="slidenum">
+            <a:fld id="{270B1759-A3CB-44CD-AC64-6A1991896658}" type="slidenum">
               <a:rPr lang="en-US" smtClean="0"/>
               <a:t>3</a:t>
             </a:fld>
@@ -27184,7 +27184,7 @@
           <a:lstStyle/>
           <a:p>
             <a:pPr algn="ctr"/>
-            <a:fld id="{4CFB9594-E23E-45AE-82F0-19CE0B94EFD8}" type="slidenum">
+            <a:fld id="{8A108058-2ED7-4732-9F01-886FB88E9A4B}" type="slidenum">
               <a:rPr lang="en-US" smtClean="0"/>
               <a:t>4</a:t>
             </a:fld>
@@ -35753,7 +35753,7 @@
           <a:lstStyle/>
           <a:p>
             <a:pPr algn="ctr"/>
-            <a:fld id="{D2F2483F-48D2-43AC-AC33-25157CAA885D}" type="slidenum">
+            <a:fld id="{9725EE5A-BD47-4B7F-86EB-DE867EA55445}" type="slidenum">
               <a:rPr lang="en-US" smtClean="0">
                 <a:solidFill>
                   <a:prstClr val="white"/>
@@ -37697,7 +37697,7 @@
           <a:lstStyle/>
           <a:p>
             <a:pPr algn="ctr"/>
-            <a:fld id="{5FB59250-C371-4B04-82E4-6E1BC730A6E5}" type="slidenum">
+            <a:fld id="{99D35600-B62B-4759-BFED-2E5CEF5CB60D}" type="slidenum">
               <a:rPr lang="en-US" smtClean="0">
                 <a:solidFill>
                   <a:prstClr val="white"/>
@@ -38737,7 +38737,7 @@
           <a:lstStyle/>
           <a:p>
             <a:pPr algn="ctr"/>
-            <a:fld id="{F5A6EC2B-C37F-410F-845B-E4B68C9DD051}" type="slidenum">
+            <a:fld id="{C5345C36-5A84-4FEE-B40E-6BD0D35F89E4}" type="slidenum">
               <a:rPr lang="en-US" smtClean="0"/>
               <a:t>8</a:t>
             </a:fld>
@@ -39501,7 +39501,7 @@
           <a:lstStyle/>
           <a:p>
             <a:pPr algn="ctr"/>
-            <a:fld id="{0E0FF8B6-2CCE-48F2-927F-AEDE5E580F64}" type="slidenum">
+            <a:fld id="{2F2889A9-F7A9-4ECF-B4A1-A51C45A90DBF}" type="slidenum">
               <a:rPr lang="en-US" smtClean="0"/>
               <a:t>9</a:t>
             </a:fld>
@@ -40246,101 +40246,77 @@
 
 <file path=ppt/tags/tag1.xml><?xml version="1.0" encoding="utf-8"?>
 <p:tagLst xmlns:p="http://schemas.openxmlformats.org/presentationml/2006/main">
-  <p1:tag xmlns:p1="http://schemas.openxmlformats.org/presentationml/2006/main" name="VEBENCH_MAPPINGINFOID" val="c035b6d8e6374c71a7348f058e4cbcff"/>
+  <p1:tag xmlns:p1="http://schemas.openxmlformats.org/presentationml/2006/main" name="VEBENCH_MAPPINGINFOID" val="adb8d289636841e1ac85513c5671152d"/>
 </p:tagLst>
 </file>
 
 <file path=ppt/tags/tag10.xml><?xml version="1.0" encoding="utf-8"?>
 <p:tagLst xmlns:p="http://schemas.openxmlformats.org/presentationml/2006/main">
-  <p1:tag xmlns:p1="http://schemas.openxmlformats.org/presentationml/2006/main" name="VEBENCH_MAPPINGINFOID" val="ebdb79f6307049cbb4168aeec9d74794"/>
+  <p1:tag xmlns:p1="http://schemas.openxmlformats.org/presentationml/2006/main" name="VEBENCH_MAPPINGINFOID" val="e5f32274ae1a44e2942dcd494c81db9a"/>
 </p:tagLst>
 </file>
 
 <file path=ppt/tags/tag11.xml><?xml version="1.0" encoding="utf-8"?>
 <p:tagLst xmlns:p="http://schemas.openxmlformats.org/presentationml/2006/main">
-  <p1:tag xmlns:p1="http://schemas.openxmlformats.org/presentationml/2006/main" name="VEBENCH_MAPPINGINFOID" val="3fb62d1ac55446688ed600df9be587d1"/>
+  <p1:tag xmlns:p1="http://schemas.openxmlformats.org/presentationml/2006/main" name="VEBENCH_MAPPINGINFOID" val="5eac7ae75f244d47a053914843ded67c"/>
 </p:tagLst>
 </file>
 
 <file path=ppt/tags/tag12.xml><?xml version="1.0" encoding="utf-8"?>
 <p:tagLst xmlns:p="http://schemas.openxmlformats.org/presentationml/2006/main">
-  <p1:tag xmlns:p1="http://schemas.openxmlformats.org/presentationml/2006/main" name="VEBENCH_MAPPINGINFOID" val="aac3ac4c152a49baa783c2e904dac0c4"/>
+  <p1:tag xmlns:p1="http://schemas.openxmlformats.org/presentationml/2006/main" name="VEBENCH_MAPPINGINFOID" val="f22298f045664ba69f5183a09bd203f8"/>
 </p:tagLst>
 </file>
 
 <file path=ppt/tags/tag13.xml><?xml version="1.0" encoding="utf-8"?>
 <p:tagLst xmlns:p="http://schemas.openxmlformats.org/presentationml/2006/main">
-  <p1:tag xmlns:p1="http://schemas.openxmlformats.org/presentationml/2006/main" name="VEBENCH_MAPPINGINFOID" val="fca0a5922515492fa155ec8341594da9"/>
+  <p1:tag xmlns:p1="http://schemas.openxmlformats.org/presentationml/2006/main" name="VEBENCH_MAPPINGINFOID" val="5d12505f5c5946dca8d2e036e2aa59f2"/>
 </p:tagLst>
 </file>
 
 <file path=ppt/tags/tag14.xml><?xml version="1.0" encoding="utf-8"?>
 <p:tagLst xmlns:p="http://schemas.openxmlformats.org/presentationml/2006/main">
-  <p1:tag xmlns:p1="http://schemas.openxmlformats.org/presentationml/2006/main" name="VEBENCH_MAPPINGINFOID" val="e5f32274ae1a44e2942dcd494c81db9a"/>
+  <p1:tag xmlns:p1="http://schemas.openxmlformats.org/presentationml/2006/main" name="VEBENCH_MAPPINGINFOID" val="d94e4b5c923c4955aa31e025ae45c25f"/>
 </p:tagLst>
 </file>
 
 <file path=ppt/tags/tag15.xml><?xml version="1.0" encoding="utf-8"?>
 <p:tagLst xmlns:p="http://schemas.openxmlformats.org/presentationml/2006/main">
-  <p1:tag xmlns:p1="http://schemas.openxmlformats.org/presentationml/2006/main" name="VEBENCH_MAPPINGINFOID" val="1a0299fb65734fb69e5deb8e8776b74e"/>
+  <p1:tag xmlns:p1="http://schemas.openxmlformats.org/presentationml/2006/main" name="VEBENCH_MAPPINGINFOID" val="5eac7ae75f244d47a053914843ded67c"/>
 </p:tagLst>
 </file>
 
 <file path=ppt/tags/tag16.xml><?xml version="1.0" encoding="utf-8"?>
 <p:tagLst xmlns:p="http://schemas.openxmlformats.org/presentationml/2006/main">
-  <p1:tag xmlns:p1="http://schemas.openxmlformats.org/presentationml/2006/main" name="VEBENCH_MAPPINGINFOID" val="d94e4b5c923c4955aa31e025ae45c25f"/>
+  <p1:tag xmlns:p1="http://schemas.openxmlformats.org/presentationml/2006/main" name="VEBENCH_MAPPINGINFOID" val="b7dfe3bb9d87468c8e8c7e7fc0260d1a"/>
 </p:tagLst>
 </file>
 
 <file path=ppt/tags/tag17.xml><?xml version="1.0" encoding="utf-8"?>
 <p:tagLst xmlns:p="http://schemas.openxmlformats.org/presentationml/2006/main">
-  <p1:tag xmlns:p1="http://schemas.openxmlformats.org/presentationml/2006/main" name="VEBENCH_MAPPINGINFOID" val="5d12505f5c5946dca8d2e036e2aa59f2"/>
+  <p1:tag xmlns:p1="http://schemas.openxmlformats.org/presentationml/2006/main" name="VEBENCH_MAPPINGINFOID" val="c035b6d8e6374c71a7348f058e4cbcff"/>
 </p:tagLst>
 </file>
 
 <file path=ppt/tags/tag18.xml><?xml version="1.0" encoding="utf-8"?>
 <p:tagLst xmlns:p="http://schemas.openxmlformats.org/presentationml/2006/main">
-  <p1:tag xmlns:p1="http://schemas.openxmlformats.org/presentationml/2006/main" name="VEBENCH_MAPPINGINFOID" val="f22298f045664ba69f5183a09bd203f8"/>
+  <p1:tag xmlns:p1="http://schemas.openxmlformats.org/presentationml/2006/main" name="VEBENCH_MAPPINGINFOID" val="aac3ac4c152a49baa783c2e904dac0c4"/>
 </p:tagLst>
 </file>
 
 <file path=ppt/tags/tag19.xml><?xml version="1.0" encoding="utf-8"?>
 <p:tagLst xmlns:p="http://schemas.openxmlformats.org/presentationml/2006/main">
-  <p1:tag xmlns:p1="http://schemas.openxmlformats.org/presentationml/2006/main" name="VEBENCH_MAPPINGINFOID" val="5eac7ae75f244d47a053914843ded67c"/>
+  <p1:tag xmlns:p1="http://schemas.openxmlformats.org/presentationml/2006/main" name="VEBENCH_MAPPINGINFOID" val="e5f32274ae1a44e2942dcd494c81db9a"/>
 </p:tagLst>
 </file>
 
 <file path=ppt/tags/tag2.xml><?xml version="1.0" encoding="utf-8"?>
 <p:tagLst xmlns:p="http://schemas.openxmlformats.org/presentationml/2006/main">
-  <p1:tag xmlns:p1="http://schemas.openxmlformats.org/presentationml/2006/main" name="VEBENCH_MAPPINGINFOID" val="b7dfe3bb9d87468c8e8c7e7fc0260d1a"/>
+  <p1:tag xmlns:p1="http://schemas.openxmlformats.org/presentationml/2006/main" name="VEBENCH_MAPPINGINFOID" val="aac3ac4c152a49baa783c2e904dac0c4"/>
 </p:tagLst>
 </file>
 
 <file path=ppt/tags/tag20.xml><?xml version="1.0" encoding="utf-8"?>
-<p:tagLst xmlns:p="http://schemas.openxmlformats.org/presentationml/2006/main">
-  <p1:tag xmlns:p1="http://schemas.openxmlformats.org/presentationml/2006/main" name="VEBENCH_MAPPINGINFOID" val="124e4f457c4944989910cec1d5662c32"/>
-</p:tagLst>
-</file>
-
-<file path=ppt/tags/tag21.xml><?xml version="1.0" encoding="utf-8"?>
-<p:tagLst xmlns:p="http://schemas.openxmlformats.org/presentationml/2006/main">
-  <p1:tag xmlns:p1="http://schemas.openxmlformats.org/presentationml/2006/main" name="VEBENCH_MAPPINGINFOID" val="b7dfe3bb9d87468c8e8c7e7fc0260d1a"/>
-</p:tagLst>
-</file>
-
-<file path=ppt/tags/tag22.xml><?xml version="1.0" encoding="utf-8"?>
-<p:tagLst xmlns:p="http://schemas.openxmlformats.org/presentationml/2006/main">
-  <p1:tag xmlns:p1="http://schemas.openxmlformats.org/presentationml/2006/main" name="VEBENCH_MAPPINGINFOID" val="aac3ac4c152a49baa783c2e904dac0c4"/>
-</p:tagLst>
-</file>
-
-<file path=ppt/tags/tag23.xml><?xml version="1.0" encoding="utf-8"?>
-<p:tagLst xmlns:p="http://schemas.openxmlformats.org/presentationml/2006/main">
-  <p1:tag xmlns:p1="http://schemas.openxmlformats.org/presentationml/2006/main" name="VEBENCH_MAPPINGINFOID" val="4e5c7840bc064dc4a1d96cf5230a331a"/>
-</p:tagLst>
-</file>
-
-<file path=ppt/tags/tag24.xml><?xml version="1.0" encoding="utf-8"?>
 <p:tagLst xmlns:p="http://schemas.openxmlformats.org/presentationml/2006/main">
   <p1:tag xmlns:p1="http://schemas.openxmlformats.org/presentationml/2006/main" name="AS_RELEASE_DATE" val="2013.08.23"/>
   <p1:tag xmlns:p1="http://schemas.openxmlformats.org/presentationml/2006/main" name="AS_TITLE" val="Aspose.Slides for Java"/>
@@ -40348,6 +40324,30 @@
   <p1:tag xmlns:p1="http://schemas.openxmlformats.org/presentationml/2006/main" name="MMPROD_NEXTUNIQUEID" val="10009"/>
   <p1:tag xmlns:p1="http://schemas.openxmlformats.org/presentationml/2006/main" name="MMPROD_UIDATA" val="&lt;database version=&quot;6.0&quot;&gt;&lt;object type=&quot;1&quot; unique_id=&quot;10001&quot;&gt;&lt;object type=&quot;8&quot; unique_id=&quot;715243&quot;&gt;&lt;/object&gt;&lt;object type=&quot;2&quot; unique_id=&quot;715244&quot;&gt;&lt;object type=&quot;3&quot; unique_id=&quot;715246&quot;&gt;&lt;property id=&quot;20148&quot; value=&quot;5&quot;/&gt;&lt;property id=&quot;20300&quot; value=&quot;Slide 1 - &amp;quot;Adobe Title&amp;quot;&quot;/&gt;&lt;property id=&quot;20307&quot; value=&quot;273&quot;/&gt;&lt;/object&gt;&lt;object type=&quot;3&quot; unique_id=&quot;715248&quot;&gt;&lt;property id=&quot;20148&quot; value=&quot;5&quot;/&gt;&lt;property id=&quot;20300&quot; value=&quot;Slide 2 - &amp;quot;Standard White Background Bullet Slide&amp;quot;&quot;/&gt;&lt;property id=&quot;20307&quot; value=&quot;271&quot;/&gt;&lt;/object&gt;&lt;object type=&quot;3&quot; unique_id=&quot;715249&quot;&gt;&lt;property id=&quot;20148&quot; value=&quot;5&quot;/&gt;&lt;property id=&quot;20300&quot; value=&quot;Slide 5 - &amp;quot;Using Themes to Convert Old Presentations – PPT2010 on Windows&amp;quot;&quot;/&gt;&lt;property id=&quot;20307&quot; value=&quot;257&quot;/&gt;&lt;/object&gt;&lt;object type=&quot;3&quot; unique_id=&quot;715250&quot;&gt;&lt;property id=&quot;20148&quot; value=&quot;5&quot;/&gt;&lt;property id=&quot;20300&quot; value=&quot;Slide 6 - &amp;quot;Bar Chart&amp;quot;&quot;/&gt;&lt;property id=&quot;20307&quot; value=&quot;260&quot;/&gt;&lt;/object&gt;&lt;object type=&quot;3&quot; unique_id=&quot;715251&quot;&gt;&lt;property id=&quot;20148&quot; value=&quot;5&quot;/&gt;&lt;property id=&quot;20300&quot; value=&quot;Slide 7 - &amp;quot;Pie Chart&amp;quot;&quot;/&gt;&lt;property id=&quot;20307&quot; value=&quot;264&quot;/&gt;&lt;/object&gt;&lt;object type=&quot;3&quot; unique_id=&quot;715252&quot;&gt;&lt;property id=&quot;20148&quot; value=&quot;5&quot;/&gt;&lt;property id=&quot;20300&quot; value=&quot;Slide 11 - &amp;quot;Color Palette&amp;quot;&quot;/&gt;&lt;property id=&quot;20307&quot; value=&quot;267&quot;/&gt;&lt;/object&gt;&lt;object type=&quot;3&quot; unique_id=&quot;715253&quot;&gt;&lt;property id=&quot;20148&quot; value=&quot;5&quot;/&gt;&lt;property id=&quot;20300&quot; value=&quot;Slide 8 - &amp;quot;White Content Area Layout&amp;quot;&quot;/&gt;&lt;property id=&quot;20307&quot; value=&quot;265&quot;/&gt;&lt;/object&gt;&lt;object type=&quot;3&quot; unique_id=&quot;715254&quot;&gt;&lt;property id=&quot;20148&quot; value=&quot;5&quot;/&gt;&lt;property id=&quot;20300&quot; value=&quot;Slide 9 - &amp;quot;Gray Content Area Layout&amp;quot;&quot;/&gt;&lt;property id=&quot;20307&quot; value=&quot;258&quot;/&gt;&lt;/object&gt;&lt;object type=&quot;3&quot; unique_id=&quot;715255&quot;&gt;&lt;property id=&quot;20148&quot; value=&quot;5&quot;/&gt;&lt;property id=&quot;20300&quot; value=&quot;Slide 10 - &amp;quot;Black Content Area Layout&amp;quot;&quot;/&gt;&lt;property id=&quot;20307&quot; value=&quot;259&quot;/&gt;&lt;/object&gt;&lt;object type=&quot;3&quot; unique_id=&quot;715256&quot;&gt;&lt;property id=&quot;20148&quot; value=&quot;5&quot;/&gt;&lt;property id=&quot;20300&quot; value=&quot;Slide 13&quot;/&gt;&lt;property id=&quot;20307&quot; value=&quot;274&quot;/&gt;&lt;/object&gt;&lt;object type=&quot;3&quot; unique_id=&quot;717641&quot;&gt;&lt;property id=&quot;20148&quot; value=&quot;5&quot;/&gt;&lt;property id=&quot;20300&quot; value=&quot;Slide 4 - &amp;quot;Properly Using Footers and Page Numbers in PowerPoint 2010&amp;quot;&quot;/&gt;&lt;property id=&quot;20307&quot; value=&quot;275&quot;/&gt;&lt;/object&gt;&lt;object type=&quot;3&quot; unique_id=&quot;717655&quot;&gt;&lt;property id=&quot;20148&quot; value=&quot;5&quot;/&gt;&lt;property id=&quot;20300&quot; value=&quot;Slide 3 - &amp;quot;How to save this template in your templates folder&amp;quot;&quot;/&gt;&lt;property id=&quot;20307&quot; value=&quot;276&quot;/&gt;&lt;/object&gt;&lt;object type=&quot;3&quot; unique_id=&quot;717656&quot;&gt;&lt;property id=&quot;20148&quot; value=&quot;5&quot;/&gt;&lt;property id=&quot;20300&quot; value=&quot;Slide 12&quot;/&gt;&lt;property id=&quot;20307&quot; value=&quot;278&quot;/&gt;&lt;/object&gt;&lt;/object&gt;&lt;/object&gt;&lt;/database&gt;"/>
   <p1:tag xmlns:p1="http://schemas.openxmlformats.org/presentationml/2006/main" name="SECTOMILLISECCONVERTED" val="1"/>
+</p:tagLst>
+</file>
+
+<file path=ppt/tags/tag21.xml><?xml version="1.0" encoding="utf-8"?>
+<p:tagLst xmlns:p="http://schemas.openxmlformats.org/presentationml/2006/main">
+  <p1:tag xmlns:p1="http://schemas.openxmlformats.org/presentationml/2006/main" name="VEBENCH_MAPPINGINFOID" val="124e4f457c4944989910cec1d5662c32"/>
+</p:tagLst>
+</file>
+
+<file path=ppt/tags/tag22.xml><?xml version="1.0" encoding="utf-8"?>
+<p:tagLst xmlns:p="http://schemas.openxmlformats.org/presentationml/2006/main">
+  <p1:tag xmlns:p1="http://schemas.openxmlformats.org/presentationml/2006/main" name="VEBENCH_MAPPINGINFOID" val="2eb26ce246d545648400c4eb0b2eeb38"/>
+</p:tagLst>
+</file>
+
+<file path=ppt/tags/tag23.xml><?xml version="1.0" encoding="utf-8"?>
+<p:tagLst xmlns:p="http://schemas.openxmlformats.org/presentationml/2006/main">
+  <p1:tag xmlns:p1="http://schemas.openxmlformats.org/presentationml/2006/main" name="VEBENCH_MAPPINGINFOID" val="1a0299fb65734fb69e5deb8e8776b74e"/>
+</p:tagLst>
+</file>
+
+<file path=ppt/tags/tag24.xml><?xml version="1.0" encoding="utf-8"?>
+<p:tagLst xmlns:p="http://schemas.openxmlformats.org/presentationml/2006/main">
+  <p1:tag xmlns:p1="http://schemas.openxmlformats.org/presentationml/2006/main" name="VEBENCH_MAPPINGINFOID" val="3fb62d1ac55446688ed600df9be587d1"/>
 </p:tagLst>
 </file>
 
@@ -40359,100 +40359,158 @@
 
 <file path=ppt/tags/tag3.xml><?xml version="1.0" encoding="utf-8"?>
 <p:tagLst xmlns:p="http://schemas.openxmlformats.org/presentationml/2006/main">
-  <p1:tag xmlns:p1="http://schemas.openxmlformats.org/presentationml/2006/main" name="VEBENCH_MAPPINGINFOID" val="12ad74a20abd48c6807bcacff3151ccc"/>
+  <p1:tag xmlns:p1="http://schemas.openxmlformats.org/presentationml/2006/main" name="VEBENCH_MAPPINGINFOID" val="ebdb79f6307049cbb4168aeec9d74794"/>
 </p:tagLst>
 </file>
 
 <file path=ppt/tags/tag4.xml><?xml version="1.0" encoding="utf-8"?>
 <p:tagLst xmlns:p="http://schemas.openxmlformats.org/presentationml/2006/main">
-  <p1:tag xmlns:p1="http://schemas.openxmlformats.org/presentationml/2006/main" name="VEBENCH_MAPPINGINFOID" val="e5f32274ae1a44e2942dcd494c81db9a"/>
+  <p1:tag xmlns:p1="http://schemas.openxmlformats.org/presentationml/2006/main" name="VEBENCH_MAPPINGINFOID" val="dd65d9c1d9454aec9fe39ee8d4147a29"/>
 </p:tagLst>
 </file>
 
 <file path=ppt/tags/tag5.xml><?xml version="1.0" encoding="utf-8"?>
 <p:tagLst xmlns:p="http://schemas.openxmlformats.org/presentationml/2006/main">
-  <p1:tag xmlns:p1="http://schemas.openxmlformats.org/presentationml/2006/main" name="VEBENCH_MAPPINGINFOID" val="12ad74a20abd48c6807bcacff3151ccc"/>
+  <p1:tag xmlns:p1="http://schemas.openxmlformats.org/presentationml/2006/main" name="VEBENCH_MAPPINGINFOID" val="b7dfe3bb9d87468c8e8c7e7fc0260d1a"/>
 </p:tagLst>
 </file>
 
 <file path=ppt/tags/tag6.xml><?xml version="1.0" encoding="utf-8"?>
 <p:tagLst xmlns:p="http://schemas.openxmlformats.org/presentationml/2006/main">
-  <p1:tag xmlns:p1="http://schemas.openxmlformats.org/presentationml/2006/main" name="VEBENCH_MAPPINGINFOID" val="adb8d289636841e1ac85513c5671152d"/>
+  <p1:tag xmlns:p1="http://schemas.openxmlformats.org/presentationml/2006/main" name="VEBENCH_MAPPINGINFOID" val="12ad74a20abd48c6807bcacff3151ccc"/>
 </p:tagLst>
 </file>
 
 <file path=ppt/tags/tag7.xml><?xml version="1.0" encoding="utf-8"?>
 <p:tagLst xmlns:p="http://schemas.openxmlformats.org/presentationml/2006/main">
-  <p1:tag xmlns:p1="http://schemas.openxmlformats.org/presentationml/2006/main" name="VEBENCH_MAPPINGINFOID" val="dd65d9c1d9454aec9fe39ee8d4147a29"/>
+  <p1:tag xmlns:p1="http://schemas.openxmlformats.org/presentationml/2006/main" name="VEBENCH_MAPPINGINFOID" val="4e5c7840bc064dc4a1d96cf5230a331a"/>
 </p:tagLst>
 </file>
 
 <file path=ppt/tags/tag8.xml><?xml version="1.0" encoding="utf-8"?>
 <p:tagLst xmlns:p="http://schemas.openxmlformats.org/presentationml/2006/main">
-  <p1:tag xmlns:p1="http://schemas.openxmlformats.org/presentationml/2006/main" name="VEBENCH_MAPPINGINFOID" val="2eb26ce246d545648400c4eb0b2eeb38"/>
+  <p1:tag xmlns:p1="http://schemas.openxmlformats.org/presentationml/2006/main" name="VEBENCH_MAPPINGINFOID" val="fca0a5922515492fa155ec8341594da9"/>
 </p:tagLst>
 </file>
 
 <file path=ppt/tags/tag9.xml><?xml version="1.0" encoding="utf-8"?>
 <p:tagLst xmlns:p="http://schemas.openxmlformats.org/presentationml/2006/main">
-  <p1:tag xmlns:p1="http://schemas.openxmlformats.org/presentationml/2006/main" name="VEBENCH_MAPPINGINFOID" val="5eac7ae75f244d47a053914843ded67c"/>
+  <p1:tag xmlns:p1="http://schemas.openxmlformats.org/presentationml/2006/main" name="VEBENCH_MAPPINGINFOID" val="12ad74a20abd48c6807bcacff3151ccc"/>
 </p:tagLst>
 </file>
 
 <file path=ppt/theme/theme1.xml><?xml version="1.0" encoding="utf-8"?>
-<a:theme xmlns:a="http://schemas.openxmlformats.org/drawingml/2006/main" name="Adobe Master Standard 2012a">
+<a:theme xmlns:a="http://schemas.openxmlformats.org/drawingml/2006/main" name="Office Theme">
   <a1:themeElements xmlns:a1="http://schemas.openxmlformats.org/drawingml/2006/main">
-    <a2:clrScheme xmlns:a2="http://schemas.openxmlformats.org/drawingml/2006/main" name="Adobe 2009">
+    <a2:clrScheme xmlns:a2="http://schemas.openxmlformats.org/drawingml/2006/main" name="Office">
       <a3:dk1 xmlns:a3="http://schemas.openxmlformats.org/drawingml/2006/main">
-        <a4:srgbClr xmlns:a4="http://schemas.openxmlformats.org/drawingml/2006/main" val="000000"/>
+        <a4:sysClr xmlns:a4="http://schemas.openxmlformats.org/drawingml/2006/main" val="windowText" lastClr="000000"/>
       </a3:dk1>
       <a3:lt1 xmlns:a3="http://schemas.openxmlformats.org/drawingml/2006/main">
         <a4:sysClr xmlns:a4="http://schemas.openxmlformats.org/drawingml/2006/main" val="window" lastClr="FFFFFF"/>
       </a3:lt1>
       <a3:dk2 xmlns:a3="http://schemas.openxmlformats.org/drawingml/2006/main">
-        <a4:srgbClr xmlns:a4="http://schemas.openxmlformats.org/drawingml/2006/main" val="6B737B"/>
+        <a4:srgbClr xmlns:a4="http://schemas.openxmlformats.org/drawingml/2006/main" val="1F497D"/>
       </a3:dk2>
       <a3:lt2 xmlns:a3="http://schemas.openxmlformats.org/drawingml/2006/main">
-        <a4:srgbClr xmlns:a4="http://schemas.openxmlformats.org/drawingml/2006/main" val="DADDE0"/>
+        <a4:srgbClr xmlns:a4="http://schemas.openxmlformats.org/drawingml/2006/main" val="EEECE1"/>
       </a3:lt2>
       <a3:accent1 xmlns:a3="http://schemas.openxmlformats.org/drawingml/2006/main">
-        <a4:srgbClr xmlns:a4="http://schemas.openxmlformats.org/drawingml/2006/main" val="C1D82F"/>
+        <a4:srgbClr xmlns:a4="http://schemas.openxmlformats.org/drawingml/2006/main" val="4F81BD"/>
       </a3:accent1>
       <a3:accent2 xmlns:a3="http://schemas.openxmlformats.org/drawingml/2006/main">
-        <a4:srgbClr xmlns:a4="http://schemas.openxmlformats.org/drawingml/2006/main" val="00A4E4"/>
+        <a4:srgbClr xmlns:a4="http://schemas.openxmlformats.org/drawingml/2006/main" val="C0504D"/>
       </a3:accent2>
       <a3:accent3 xmlns:a3="http://schemas.openxmlformats.org/drawingml/2006/main">
-        <a4:srgbClr xmlns:a4="http://schemas.openxmlformats.org/drawingml/2006/main" val="8348B5"/>
+        <a4:srgbClr xmlns:a4="http://schemas.openxmlformats.org/drawingml/2006/main" val="9BBB59"/>
       </a3:accent3>
       <a3:accent4 xmlns:a3="http://schemas.openxmlformats.org/drawingml/2006/main">
-        <a4:srgbClr xmlns:a4="http://schemas.openxmlformats.org/drawingml/2006/main" val="FBB034"/>
+        <a4:srgbClr xmlns:a4="http://schemas.openxmlformats.org/drawingml/2006/main" val="8064A2"/>
       </a3:accent4>
       <a3:accent5 xmlns:a3="http://schemas.openxmlformats.org/drawingml/2006/main">
-        <a4:srgbClr xmlns:a4="http://schemas.openxmlformats.org/drawingml/2006/main" val="FFDD00"/>
+        <a4:srgbClr xmlns:a4="http://schemas.openxmlformats.org/drawingml/2006/main" val="4BACC6"/>
       </a3:accent5>
       <a3:accent6 xmlns:a3="http://schemas.openxmlformats.org/drawingml/2006/main">
-        <a4:srgbClr xmlns:a4="http://schemas.openxmlformats.org/drawingml/2006/main" val="FF0000"/>
+        <a4:srgbClr xmlns:a4="http://schemas.openxmlformats.org/drawingml/2006/main" val="F79646"/>
       </a3:accent6>
       <a3:hlink xmlns:a3="http://schemas.openxmlformats.org/drawingml/2006/main">
-        <a4:srgbClr xmlns:a4="http://schemas.openxmlformats.org/drawingml/2006/main" val="000000"/>
+        <a4:srgbClr xmlns:a4="http://schemas.openxmlformats.org/drawingml/2006/main" val="0000FF"/>
       </a3:hlink>
       <a3:folHlink xmlns:a3="http://schemas.openxmlformats.org/drawingml/2006/main">
-        <a4:srgbClr xmlns:a4="http://schemas.openxmlformats.org/drawingml/2006/main" val="3F3F3F"/>
+        <a4:srgbClr xmlns:a4="http://schemas.openxmlformats.org/drawingml/2006/main" val="800080"/>
       </a3:folHlink>
     </a2:clrScheme>
-    <a2:fontScheme xmlns:a2="http://schemas.openxmlformats.org/drawingml/2006/main" name="Adobe Clean 2009">
+    <a2:fontScheme xmlns:a2="http://schemas.openxmlformats.org/drawingml/2006/main" name="Office">
       <a3:majorFont xmlns:a3="http://schemas.openxmlformats.org/drawingml/2006/main">
-        <a4:latin xmlns:a4="http://schemas.openxmlformats.org/drawingml/2006/main" typeface="Adobe Clean"/>
+        <a4:latin xmlns:a4="http://schemas.openxmlformats.org/drawingml/2006/main" typeface="Calibri"/>
         <a4:ea xmlns:a4="http://schemas.openxmlformats.org/drawingml/2006/main" typeface=""/>
         <a4:cs xmlns:a4="http://schemas.openxmlformats.org/drawingml/2006/main" typeface=""/>
+        <a4:font xmlns:a4="http://schemas.openxmlformats.org/drawingml/2006/main" script="Syrc" typeface="Estrangelo Edessa"/>
+        <a4:font xmlns:a4="http://schemas.openxmlformats.org/drawingml/2006/main" script="Orya" typeface="Kalinga"/>
+        <a4:font xmlns:a4="http://schemas.openxmlformats.org/drawingml/2006/main" script="Jpan" typeface="ＭＳ Ｐゴシック"/>
+        <a4:font xmlns:a4="http://schemas.openxmlformats.org/drawingml/2006/main" script="Guru" typeface="Raavi"/>
+        <a4:font xmlns:a4="http://schemas.openxmlformats.org/drawingml/2006/main" script="Uigh" typeface="Microsoft Uighur"/>
+        <a4:font xmlns:a4="http://schemas.openxmlformats.org/drawingml/2006/main" script="Gujr" typeface="Shruti"/>
+        <a4:font xmlns:a4="http://schemas.openxmlformats.org/drawingml/2006/main" script="Beng" typeface="Vrinda"/>
+        <a4:font xmlns:a4="http://schemas.openxmlformats.org/drawingml/2006/main" script="Yiii" typeface="Microsoft Yi Baiti"/>
+        <a4:font xmlns:a4="http://schemas.openxmlformats.org/drawingml/2006/main" script="Thaa" typeface="MV Boli"/>
+        <a4:font xmlns:a4="http://schemas.openxmlformats.org/drawingml/2006/main" script="Khmr" typeface="MoolBoran"/>
+        <a4:font xmlns:a4="http://schemas.openxmlformats.org/drawingml/2006/main" script="Taml" typeface="Latha"/>
+        <a4:font xmlns:a4="http://schemas.openxmlformats.org/drawingml/2006/main" script="Cans" typeface="Euphemia"/>
+        <a4:font xmlns:a4="http://schemas.openxmlformats.org/drawingml/2006/main" script="Telu" typeface="Gautami"/>
+        <a4:font xmlns:a4="http://schemas.openxmlformats.org/drawingml/2006/main" script="Laoo" typeface="DokChampa"/>
+        <a4:font xmlns:a4="http://schemas.openxmlformats.org/drawingml/2006/main" script="Deva" typeface="Mangal"/>
+        <a4:font xmlns:a4="http://schemas.openxmlformats.org/drawingml/2006/main" script="Knda" typeface="Tunga"/>
+        <a4:font xmlns:a4="http://schemas.openxmlformats.org/drawingml/2006/main" script="Cher" typeface="Plantagenet Cherokee"/>
+        <a4:font xmlns:a4="http://schemas.openxmlformats.org/drawingml/2006/main" script="Arab" typeface="Times New Roman"/>
+        <a4:font xmlns:a4="http://schemas.openxmlformats.org/drawingml/2006/main" script="Mlym" typeface="Kartika"/>
+        <a4:font xmlns:a4="http://schemas.openxmlformats.org/drawingml/2006/main" script="Thai" typeface="Angsana New"/>
+        <a4:font xmlns:a4="http://schemas.openxmlformats.org/drawingml/2006/main" script="Ethi" typeface="Nyala"/>
+        <a4:font xmlns:a4="http://schemas.openxmlformats.org/drawingml/2006/main" script="Hebr" typeface="Times New Roman"/>
+        <a4:font xmlns:a4="http://schemas.openxmlformats.org/drawingml/2006/main" script="Sinh" typeface="Iskoola Pota"/>
+        <a4:font xmlns:a4="http://schemas.openxmlformats.org/drawingml/2006/main" script="Tibt" typeface="Microsoft Himalaya"/>
+        <a4:font xmlns:a4="http://schemas.openxmlformats.org/drawingml/2006/main" script="Mong" typeface="Mongolian Baiti"/>
+        <a4:font xmlns:a4="http://schemas.openxmlformats.org/drawingml/2006/main" script="Hang" typeface="맑은 고딕"/>
+        <a4:font xmlns:a4="http://schemas.openxmlformats.org/drawingml/2006/main" script="Viet" typeface="Times New Roman"/>
+        <a4:font xmlns:a4="http://schemas.openxmlformats.org/drawingml/2006/main" script="Hans" typeface="宋体"/>
+        <a4:font xmlns:a4="http://schemas.openxmlformats.org/drawingml/2006/main" script="Hant" typeface="新細明體"/>
       </a3:majorFont>
       <a3:minorFont xmlns:a3="http://schemas.openxmlformats.org/drawingml/2006/main">
-        <a4:latin xmlns:a4="http://schemas.openxmlformats.org/drawingml/2006/main" typeface="Adobe Clean"/>
+        <a4:latin xmlns:a4="http://schemas.openxmlformats.org/drawingml/2006/main" typeface="Calibri"/>
         <a4:ea xmlns:a4="http://schemas.openxmlformats.org/drawingml/2006/main" typeface=""/>
         <a4:cs xmlns:a4="http://schemas.openxmlformats.org/drawingml/2006/main" typeface=""/>
+        <a4:font xmlns:a4="http://schemas.openxmlformats.org/drawingml/2006/main" script="Syrc" typeface="Estrangelo Edessa"/>
+        <a4:font xmlns:a4="http://schemas.openxmlformats.org/drawingml/2006/main" script="Orya" typeface="Kalinga"/>
+        <a4:font xmlns:a4="http://schemas.openxmlformats.org/drawingml/2006/main" script="Jpan" typeface="ＭＳ Ｐゴシック"/>
+        <a4:font xmlns:a4="http://schemas.openxmlformats.org/drawingml/2006/main" script="Guru" typeface="Raavi"/>
+        <a4:font xmlns:a4="http://schemas.openxmlformats.org/drawingml/2006/main" script="Uigh" typeface="Microsoft Uighur"/>
+        <a4:font xmlns:a4="http://schemas.openxmlformats.org/drawingml/2006/main" script="Gujr" typeface="Shruti"/>
+        <a4:font xmlns:a4="http://schemas.openxmlformats.org/drawingml/2006/main" script="Beng" typeface="Vrinda"/>
+        <a4:font xmlns:a4="http://schemas.openxmlformats.org/drawingml/2006/main" script="Yiii" typeface="Microsoft Yi Baiti"/>
+        <a4:font xmlns:a4="http://schemas.openxmlformats.org/drawingml/2006/main" script="Thaa" typeface="MV Boli"/>
+        <a4:font xmlns:a4="http://schemas.openxmlformats.org/drawingml/2006/main" script="Khmr" typeface="DaunPenh"/>
+        <a4:font xmlns:a4="http://schemas.openxmlformats.org/drawingml/2006/main" script="Taml" typeface="Latha"/>
+        <a4:font xmlns:a4="http://schemas.openxmlformats.org/drawingml/2006/main" script="Cans" typeface="Euphemia"/>
+        <a4:font xmlns:a4="http://schemas.openxmlformats.org/drawingml/2006/main" script="Telu" typeface="Gautami"/>
+        <a4:font xmlns:a4="http://schemas.openxmlformats.org/drawingml/2006/main" script="Laoo" typeface="DokChampa"/>
+        <a4:font xmlns:a4="http://schemas.openxmlformats.org/drawingml/2006/main" script="Deva" typeface="Mangal"/>
+        <a4:font xmlns:a4="http://schemas.openxmlformats.org/drawingml/2006/main" script="Knda" typeface="Tunga"/>
+        <a4:font xmlns:a4="http://schemas.openxmlformats.org/drawingml/2006/main" script="Cher" typeface="Plantagenet Cherokee"/>
+        <a4:font xmlns:a4="http://schemas.openxmlformats.org/drawingml/2006/main" script="Arab" typeface="Arial"/>
+        <a4:font xmlns:a4="http://schemas.openxmlformats.org/drawingml/2006/main" script="Mlym" typeface="Kartika"/>
+        <a4:font xmlns:a4="http://schemas.openxmlformats.org/drawingml/2006/main" script="Thai" typeface="Cordia New"/>
+        <a4:font xmlns:a4="http://schemas.openxmlformats.org/drawingml/2006/main" script="Ethi" typeface="Nyala"/>
+        <a4:font xmlns:a4="http://schemas.openxmlformats.org/drawingml/2006/main" script="Hebr" typeface="Arial"/>
+        <a4:font xmlns:a4="http://schemas.openxmlformats.org/drawingml/2006/main" script="Sinh" typeface="Iskoola Pota"/>
+        <a4:font xmlns:a4="http://schemas.openxmlformats.org/drawingml/2006/main" script="Tibt" typeface="Microsoft Himalaya"/>
+        <a4:font xmlns:a4="http://schemas.openxmlformats.org/drawingml/2006/main" script="Mong" typeface="Mongolian Baiti"/>
+        <a4:font xmlns:a4="http://schemas.openxmlformats.org/drawingml/2006/main" script="Hang" typeface="맑은 고딕"/>
+        <a4:font xmlns:a4="http://schemas.openxmlformats.org/drawingml/2006/main" script="Viet" typeface="Arial"/>
+        <a4:font xmlns:a4="http://schemas.openxmlformats.org/drawingml/2006/main" script="Hans" typeface="宋体"/>
+        <a4:font xmlns:a4="http://schemas.openxmlformats.org/drawingml/2006/main" script="Hant" typeface="新細明體"/>
       </a3:minorFont>
     </a2:fontScheme>
-    <a2:fmtScheme xmlns:a2="http://schemas.openxmlformats.org/drawingml/2006/main" name="Trek">
+    <a2:fmtScheme xmlns:a2="http://schemas.openxmlformats.org/drawingml/2006/main" name="Office">
       <a3:fillStyleLst xmlns:a3="http://schemas.openxmlformats.org/drawingml/2006/main">
         <a4:solidFill xmlns:a4="http://schemas.openxmlformats.org/drawingml/2006/main">
           <a5:schemeClr xmlns:a5="http://schemas.openxmlformats.org/drawingml/2006/main" val="phClr"/>
@@ -40461,79 +40519,58 @@
           <a5:gsLst xmlns:a5="http://schemas.openxmlformats.org/drawingml/2006/main">
             <a6:gs xmlns:a6="http://schemas.openxmlformats.org/drawingml/2006/main" pos="0">
               <a7:schemeClr xmlns:a7="http://schemas.openxmlformats.org/drawingml/2006/main" val="phClr">
-                <a8:tint xmlns:a8="http://schemas.openxmlformats.org/drawingml/2006/main" val="30000"/>
-                <a8:satMod xmlns:a8="http://schemas.openxmlformats.org/drawingml/2006/main" val="250000"/>
+                <a8:tint xmlns:a8="http://schemas.openxmlformats.org/drawingml/2006/main" val="50000"/>
+                <a8:satMod xmlns:a8="http://schemas.openxmlformats.org/drawingml/2006/main" val="300000"/>
               </a7:schemeClr>
             </a6:gs>
-            <a6:gs xmlns:a6="http://schemas.openxmlformats.org/drawingml/2006/main" pos="72000">
+            <a6:gs xmlns:a6="http://schemas.openxmlformats.org/drawingml/2006/main" pos="35000">
               <a7:schemeClr xmlns:a7="http://schemas.openxmlformats.org/drawingml/2006/main" val="phClr">
-                <a8:tint xmlns:a8="http://schemas.openxmlformats.org/drawingml/2006/main" val="75000"/>
-                <a8:satMod xmlns:a8="http://schemas.openxmlformats.org/drawingml/2006/main" val="210000"/>
+                <a8:tint xmlns:a8="http://schemas.openxmlformats.org/drawingml/2006/main" val="37000"/>
+                <a8:satMod xmlns:a8="http://schemas.openxmlformats.org/drawingml/2006/main" val="300000"/>
               </a7:schemeClr>
             </a6:gs>
             <a6:gs xmlns:a6="http://schemas.openxmlformats.org/drawingml/2006/main" pos="100000">
               <a7:schemeClr xmlns:a7="http://schemas.openxmlformats.org/drawingml/2006/main" val="phClr">
-                <a8:tint xmlns:a8="http://schemas.openxmlformats.org/drawingml/2006/main" val="85000"/>
-                <a8:satMod xmlns:a8="http://schemas.openxmlformats.org/drawingml/2006/main" val="210000"/>
+                <a8:tint xmlns:a8="http://schemas.openxmlformats.org/drawingml/2006/main" val="15000"/>
+                <a8:satMod xmlns:a8="http://schemas.openxmlformats.org/drawingml/2006/main" val="350000"/>
               </a7:schemeClr>
             </a6:gs>
           </a5:gsLst>
-          <a5:lin xmlns:a5="http://schemas.openxmlformats.org/drawingml/2006/main" ang="5400000" scaled="1"/>
+          <a5:lin xmlns:a5="http://schemas.openxmlformats.org/drawingml/2006/main" ang="16200000" scaled="1"/>
           <a5:tileRect xmlns:a5="http://schemas.openxmlformats.org/drawingml/2006/main"/>
         </a4:gradFill>
         <a4:gradFill xmlns:a4="http://schemas.openxmlformats.org/drawingml/2006/main" rotWithShape="1">
           <a5:gsLst xmlns:a5="http://schemas.openxmlformats.org/drawingml/2006/main">
             <a6:gs xmlns:a6="http://schemas.openxmlformats.org/drawingml/2006/main" pos="0">
               <a7:schemeClr xmlns:a7="http://schemas.openxmlformats.org/drawingml/2006/main" val="phClr">
-                <a8:tint xmlns:a8="http://schemas.openxmlformats.org/drawingml/2006/main" val="75000"/>
-                <a8:shade xmlns:a8="http://schemas.openxmlformats.org/drawingml/2006/main" val="85000"/>
-                <a8:satMod xmlns:a8="http://schemas.openxmlformats.org/drawingml/2006/main" val="230000"/>
-              </a7:schemeClr>
-            </a6:gs>
-            <a6:gs xmlns:a6="http://schemas.openxmlformats.org/drawingml/2006/main" pos="25000">
-              <a7:schemeClr xmlns:a7="http://schemas.openxmlformats.org/drawingml/2006/main" val="phClr">
-                <a8:tint xmlns:a8="http://schemas.openxmlformats.org/drawingml/2006/main" val="90000"/>
-                <a8:shade xmlns:a8="http://schemas.openxmlformats.org/drawingml/2006/main" val="70000"/>
-                <a8:satMod xmlns:a8="http://schemas.openxmlformats.org/drawingml/2006/main" val="220000"/>
-              </a7:schemeClr>
-            </a6:gs>
-            <a6:gs xmlns:a6="http://schemas.openxmlformats.org/drawingml/2006/main" pos="50000">
-              <a7:schemeClr xmlns:a7="http://schemas.openxmlformats.org/drawingml/2006/main" val="phClr">
-                <a8:tint xmlns:a8="http://schemas.openxmlformats.org/drawingml/2006/main" val="90000"/>
-                <a8:shade xmlns:a8="http://schemas.openxmlformats.org/drawingml/2006/main" val="58000"/>
-                <a8:satMod xmlns:a8="http://schemas.openxmlformats.org/drawingml/2006/main" val="225000"/>
-              </a7:schemeClr>
-            </a6:gs>
-            <a6:gs xmlns:a6="http://schemas.openxmlformats.org/drawingml/2006/main" pos="65000">
-              <a7:schemeClr xmlns:a7="http://schemas.openxmlformats.org/drawingml/2006/main" val="phClr">
-                <a8:tint xmlns:a8="http://schemas.openxmlformats.org/drawingml/2006/main" val="90000"/>
-                <a8:shade xmlns:a8="http://schemas.openxmlformats.org/drawingml/2006/main" val="58000"/>
-                <a8:satMod xmlns:a8="http://schemas.openxmlformats.org/drawingml/2006/main" val="225000"/>
+                <a8:shade xmlns:a8="http://schemas.openxmlformats.org/drawingml/2006/main" val="51000"/>
+                <a8:satMod xmlns:a8="http://schemas.openxmlformats.org/drawingml/2006/main" val="130000"/>
               </a7:schemeClr>
             </a6:gs>
             <a6:gs xmlns:a6="http://schemas.openxmlformats.org/drawingml/2006/main" pos="80000">
               <a7:schemeClr xmlns:a7="http://schemas.openxmlformats.org/drawingml/2006/main" val="phClr">
-                <a8:tint xmlns:a8="http://schemas.openxmlformats.org/drawingml/2006/main" val="90000"/>
-                <a8:shade xmlns:a8="http://schemas.openxmlformats.org/drawingml/2006/main" val="69000"/>
-                <a8:satMod xmlns:a8="http://schemas.openxmlformats.org/drawingml/2006/main" val="220000"/>
+                <a8:shade xmlns:a8="http://schemas.openxmlformats.org/drawingml/2006/main" val="93000"/>
+                <a8:satMod xmlns:a8="http://schemas.openxmlformats.org/drawingml/2006/main" val="130000"/>
               </a7:schemeClr>
             </a6:gs>
             <a6:gs xmlns:a6="http://schemas.openxmlformats.org/drawingml/2006/main" pos="100000">
               <a7:schemeClr xmlns:a7="http://schemas.openxmlformats.org/drawingml/2006/main" val="phClr">
-                <a8:tint xmlns:a8="http://schemas.openxmlformats.org/drawingml/2006/main" val="77000"/>
-                <a8:shade xmlns:a8="http://schemas.openxmlformats.org/drawingml/2006/main" val="80000"/>
-                <a8:satMod xmlns:a8="http://schemas.openxmlformats.org/drawingml/2006/main" val="230000"/>
+                <a8:shade xmlns:a8="http://schemas.openxmlformats.org/drawingml/2006/main" val="94000"/>
+                <a8:satMod xmlns:a8="http://schemas.openxmlformats.org/drawingml/2006/main" val="135000"/>
               </a7:schemeClr>
             </a6:gs>
           </a5:gsLst>
-          <a5:lin xmlns:a5="http://schemas.openxmlformats.org/drawingml/2006/main" ang="5400000" scaled="1"/>
+          <a5:lin xmlns:a5="http://schemas.openxmlformats.org/drawingml/2006/main" ang="16200000" scaled="0"/>
           <a5:tileRect xmlns:a5="http://schemas.openxmlformats.org/drawingml/2006/main"/>
         </a4:gradFill>
       </a3:fillStyleLst>
       <a3:lnStyleLst xmlns:a3="http://schemas.openxmlformats.org/drawingml/2006/main">
-        <a4:ln xmlns:a4="http://schemas.openxmlformats.org/drawingml/2006/main" w="10000" cap="flat" cmpd="sng" algn="ctr">
+        <a4:ln xmlns:a4="http://schemas.openxmlformats.org/drawingml/2006/main" w="9525" cap="flat" cmpd="sng" algn="ctr">
           <solidFill xmlns="http://schemas.openxmlformats.org/drawingml/2006/main">
-            <a5:schemeClr xmlns:a5="http://schemas.openxmlformats.org/drawingml/2006/main" val="phClr"/>
+            <a5:schemeClr xmlns:a5="http://schemas.openxmlformats.org/drawingml/2006/main" val="phClr">
+              <a6:shade xmlns:a6="http://schemas.openxmlformats.org/drawingml/2006/main" val="95000"/>
+              <a6:satMod xmlns:a6="http://schemas.openxmlformats.org/drawingml/2006/main" val="105000"/>
+            </a5:schemeClr>
           </solidFill>
           <a5:prstDash xmlns:a5="http://schemas.openxmlformats.org/drawingml/2006/main" val="solid"/>
         </a4:ln>
@@ -40553,18 +40590,27 @@
       <a3:effectStyleLst xmlns:a3="http://schemas.openxmlformats.org/drawingml/2006/main">
         <a4:effectStyle xmlns:a4="http://schemas.openxmlformats.org/drawingml/2006/main">
           <a5:effectLst xmlns:a5="http://schemas.openxmlformats.org/drawingml/2006/main">
-            <a6:outerShdw xmlns:a6="http://schemas.openxmlformats.org/drawingml/2006/main" blurRad="76200" dir="5400000" dist="50800" rotWithShape="0">
-              <a7:srgbClr xmlns:a7="http://schemas.openxmlformats.org/drawingml/2006/main" val="4E3B30">
-                <a8:alpha xmlns:a8="http://schemas.openxmlformats.org/drawingml/2006/main" val="60000"/>
+            <a6:outerShdw xmlns:a6="http://schemas.openxmlformats.org/drawingml/2006/main" blurRad="40000" dir="5400000" dist="20000" rotWithShape="0">
+              <a7:srgbClr xmlns:a7="http://schemas.openxmlformats.org/drawingml/2006/main" val="000000">
+                <a8:alpha xmlns:a8="http://schemas.openxmlformats.org/drawingml/2006/main" val="38000"/>
               </a7:srgbClr>
             </a6:outerShdw>
           </a5:effectLst>
         </a4:effectStyle>
         <a4:effectStyle xmlns:a4="http://schemas.openxmlformats.org/drawingml/2006/main">
           <a5:effectLst xmlns:a5="http://schemas.openxmlformats.org/drawingml/2006/main">
-            <a6:outerShdw xmlns:a6="http://schemas.openxmlformats.org/drawingml/2006/main" blurRad="76200" dir="5400000" dist="50800" rotWithShape="0">
-              <a7:srgbClr xmlns:a7="http://schemas.openxmlformats.org/drawingml/2006/main" val="4E3B30">
-                <a8:alpha xmlns:a8="http://schemas.openxmlformats.org/drawingml/2006/main" val="60000"/>
+            <a6:outerShdw xmlns:a6="http://schemas.openxmlformats.org/drawingml/2006/main" blurRad="40000" dir="5400000" dist="23000" rotWithShape="0">
+              <a7:srgbClr xmlns:a7="http://schemas.openxmlformats.org/drawingml/2006/main" val="000000">
+                <a8:alpha xmlns:a8="http://schemas.openxmlformats.org/drawingml/2006/main" val="35000"/>
+              </a7:srgbClr>
+            </a6:outerShdw>
+          </a5:effectLst>
+        </a4:effectStyle>
+        <a4:effectStyle xmlns:a4="http://schemas.openxmlformats.org/drawingml/2006/main">
+          <a5:effectLst xmlns:a5="http://schemas.openxmlformats.org/drawingml/2006/main">
+            <a6:outerShdw xmlns:a6="http://schemas.openxmlformats.org/drawingml/2006/main" blurRad="40000" dir="5400000" dist="23000" rotWithShape="0">
+              <a7:srgbClr xmlns:a7="http://schemas.openxmlformats.org/drawingml/2006/main" val="000000">
+                <a8:alpha xmlns:a8="http://schemas.openxmlformats.org/drawingml/2006/main" val="35000"/>
               </a7:srgbClr>
             </a6:outerShdw>
           </a5:effectLst>
@@ -40572,36 +40618,12 @@
             <a6:camera xmlns:a6="http://schemas.openxmlformats.org/drawingml/2006/main" prst="orthographicFront">
               <a7:rot xmlns:a7="http://schemas.openxmlformats.org/drawingml/2006/main" lat="0" lon="0" rev="0"/>
             </a6:camera>
-            <a6:lightRig xmlns:a6="http://schemas.openxmlformats.org/drawingml/2006/main" dir="tl" rig="threePt"/>
-          </a5:scene3d>
-          <a5:sp3d xmlns:a5="http://schemas.openxmlformats.org/drawingml/2006/main" prstMaterial="metal">
-            <a6:bevelT xmlns:a6="http://schemas.openxmlformats.org/drawingml/2006/main" w="10000" h="10000" prst="circle"/>
-          </a5:sp3d>
-        </a4:effectStyle>
-        <a4:effectStyle xmlns:a4="http://schemas.openxmlformats.org/drawingml/2006/main">
-          <a5:effectLst xmlns:a5="http://schemas.openxmlformats.org/drawingml/2006/main">
-            <a6:outerShdw xmlns:a6="http://schemas.openxmlformats.org/drawingml/2006/main" blurRad="76200" dir="5400000" dist="50800" rotWithShape="0">
-              <a7:srgbClr xmlns:a7="http://schemas.openxmlformats.org/drawingml/2006/main" val="4E3B30">
-                <a8:alpha xmlns:a8="http://schemas.openxmlformats.org/drawingml/2006/main" val="60000"/>
-              </a7:srgbClr>
-            </a6:outerShdw>
-          </a5:effectLst>
-          <a5:scene3d xmlns:a5="http://schemas.openxmlformats.org/drawingml/2006/main">
-            <a6:camera xmlns:a6="http://schemas.openxmlformats.org/drawingml/2006/main" prst="obliqueTopLeft" fov="600000">
-              <a7:rot xmlns:a7="http://schemas.openxmlformats.org/drawingml/2006/main" lat="0" lon="0" rev="0"/>
-            </a6:camera>
-            <a6:lightRig xmlns:a6="http://schemas.openxmlformats.org/drawingml/2006/main" dir="t" rig="balanced">
-              <a7:rot xmlns:a7="http://schemas.openxmlformats.org/drawingml/2006/main" lat="0" lon="0" rev="19200000"/>
+            <a6:lightRig xmlns:a6="http://schemas.openxmlformats.org/drawingml/2006/main" dir="t" rig="threePt">
+              <a7:rot xmlns:a7="http://schemas.openxmlformats.org/drawingml/2006/main" lat="0" lon="0" rev="1200000"/>
             </a6:lightRig>
           </a5:scene3d>
-          <a5:sp3d xmlns:a5="http://schemas.openxmlformats.org/drawingml/2006/main" contourW="12700" prstMaterial="matte">
-            <a6:bevelT xmlns:a6="http://schemas.openxmlformats.org/drawingml/2006/main" w="60000" h="50800" prst="circle"/>
-            <a6:contourClr xmlns:a6="http://schemas.openxmlformats.org/drawingml/2006/main">
-              <a7:schemeClr xmlns:a7="http://schemas.openxmlformats.org/drawingml/2006/main" val="phClr">
-                <a8:shade xmlns:a8="http://schemas.openxmlformats.org/drawingml/2006/main" val="60000"/>
-                <a8:satMod xmlns:a8="http://schemas.openxmlformats.org/drawingml/2006/main" val="110000"/>
-              </a7:schemeClr>
-            </a6:contourClr>
+          <a5:sp3d xmlns:a5="http://schemas.openxmlformats.org/drawingml/2006/main">
+            <a6:bevelT xmlns:a6="http://schemas.openxmlformats.org/drawingml/2006/main" w="63500" h="25400" prst="circle"/>
           </a5:sp3d>
         </a4:effectStyle>
       </a3:effectStyleLst>
@@ -40983,117 +41005,59 @@
 </file>
 
 <file path=ppt/theme/theme3.xml><?xml version="1.0" encoding="utf-8"?>
-<a:theme xmlns:a="http://schemas.openxmlformats.org/drawingml/2006/main" name="Office Theme">
+<a:theme xmlns:a="http://schemas.openxmlformats.org/drawingml/2006/main" name="Adobe Master Standard 2012a">
   <a1:themeElements xmlns:a1="http://schemas.openxmlformats.org/drawingml/2006/main">
-    <a2:clrScheme xmlns:a2="http://schemas.openxmlformats.org/drawingml/2006/main" name="Office">
+    <a2:clrScheme xmlns:a2="http://schemas.openxmlformats.org/drawingml/2006/main" name="Adobe 2009">
       <a3:dk1 xmlns:a3="http://schemas.openxmlformats.org/drawingml/2006/main">
-        <a4:sysClr xmlns:a4="http://schemas.openxmlformats.org/drawingml/2006/main" val="windowText" lastClr="000000"/>
+        <a4:srgbClr xmlns:a4="http://schemas.openxmlformats.org/drawingml/2006/main" val="000000"/>
       </a3:dk1>
       <a3:lt1 xmlns:a3="http://schemas.openxmlformats.org/drawingml/2006/main">
         <a4:sysClr xmlns:a4="http://schemas.openxmlformats.org/drawingml/2006/main" val="window" lastClr="FFFFFF"/>
       </a3:lt1>
       <a3:dk2 xmlns:a3="http://schemas.openxmlformats.org/drawingml/2006/main">
-        <a4:srgbClr xmlns:a4="http://schemas.openxmlformats.org/drawingml/2006/main" val="1F497D"/>
+        <a4:srgbClr xmlns:a4="http://schemas.openxmlformats.org/drawingml/2006/main" val="6B737B"/>
       </a3:dk2>
       <a3:lt2 xmlns:a3="http://schemas.openxmlformats.org/drawingml/2006/main">
-        <a4:srgbClr xmlns:a4="http://schemas.openxmlformats.org/drawingml/2006/main" val="EEECE1"/>
+        <a4:srgbClr xmlns:a4="http://schemas.openxmlformats.org/drawingml/2006/main" val="DADDE0"/>
       </a3:lt2>
       <a3:accent1 xmlns:a3="http://schemas.openxmlformats.org/drawingml/2006/main">
-        <a4:srgbClr xmlns:a4="http://schemas.openxmlformats.org/drawingml/2006/main" val="4F81BD"/>
+        <a4:srgbClr xmlns:a4="http://schemas.openxmlformats.org/drawingml/2006/main" val="C1D82F"/>
       </a3:accent1>
       <a3:accent2 xmlns:a3="http://schemas.openxmlformats.org/drawingml/2006/main">
-        <a4:srgbClr xmlns:a4="http://schemas.openxmlformats.org/drawingml/2006/main" val="C0504D"/>
+        <a4:srgbClr xmlns:a4="http://schemas.openxmlformats.org/drawingml/2006/main" val="00A4E4"/>
       </a3:accent2>
       <a3:accent3 xmlns:a3="http://schemas.openxmlformats.org/drawingml/2006/main">
-        <a4:srgbClr xmlns:a4="http://schemas.openxmlformats.org/drawingml/2006/main" val="9BBB59"/>
+        <a4:srgbClr xmlns:a4="http://schemas.openxmlformats.org/drawingml/2006/main" val="8348B5"/>
       </a3:accent3>
       <a3:accent4 xmlns:a3="http://schemas.openxmlformats.org/drawingml/2006/main">
-        <a4:srgbClr xmlns:a4="http://schemas.openxmlformats.org/drawingml/2006/main" val="8064A2"/>
+        <a4:srgbClr xmlns:a4="http://schemas.openxmlformats.org/drawingml/2006/main" val="FBB034"/>
       </a3:accent4>
       <a3:accent5 xmlns:a3="http://schemas.openxmlformats.org/drawingml/2006/main">
-        <a4:srgbClr xmlns:a4="http://schemas.openxmlformats.org/drawingml/2006/main" val="4BACC6"/>
+        <a4:srgbClr xmlns:a4="http://schemas.openxmlformats.org/drawingml/2006/main" val="FFDD00"/>
       </a3:accent5>
       <a3:accent6 xmlns:a3="http://schemas.openxmlformats.org/drawingml/2006/main">
-        <a4:srgbClr xmlns:a4="http://schemas.openxmlformats.org/drawingml/2006/main" val="F79646"/>
+        <a4:srgbClr xmlns:a4="http://schemas.openxmlformats.org/drawingml/2006/main" val="FF0000"/>
       </a3:accent6>
       <a3:hlink xmlns:a3="http://schemas.openxmlformats.org/drawingml/2006/main">
-        <a4:srgbClr xmlns:a4="http://schemas.openxmlformats.org/drawingml/2006/main" val="0000FF"/>
+        <a4:srgbClr xmlns:a4="http://schemas.openxmlformats.org/drawingml/2006/main" val="000000"/>
       </a3:hlink>
       <a3:folHlink xmlns:a3="http://schemas.openxmlformats.org/drawingml/2006/main">
-        <a4:srgbClr xmlns:a4="http://schemas.openxmlformats.org/drawingml/2006/main" val="800080"/>
+        <a4:srgbClr xmlns:a4="http://schemas.openxmlformats.org/drawingml/2006/main" val="3F3F3F"/>
       </a3:folHlink>
     </a2:clrScheme>
-    <a2:fontScheme xmlns:a2="http://schemas.openxmlformats.org/drawingml/2006/main" name="Office">
+    <a2:fontScheme xmlns:a2="http://schemas.openxmlformats.org/drawingml/2006/main" name="Adobe Clean 2009">
       <a3:majorFont xmlns:a3="http://schemas.openxmlformats.org/drawingml/2006/main">
-        <a4:latin xmlns:a4="http://schemas.openxmlformats.org/drawingml/2006/main" typeface="Calibri"/>
+        <a4:latin xmlns:a4="http://schemas.openxmlformats.org/drawingml/2006/main" typeface="Adobe Clean"/>
         <a4:ea xmlns:a4="http://schemas.openxmlformats.org/drawingml/2006/main" typeface=""/>
         <a4:cs xmlns:a4="http://schemas.openxmlformats.org/drawingml/2006/main" typeface=""/>
-        <a4:font xmlns:a4="http://schemas.openxmlformats.org/drawingml/2006/main" script="Syrc" typeface="Estrangelo Edessa"/>
-        <a4:font xmlns:a4="http://schemas.openxmlformats.org/drawingml/2006/main" script="Orya" typeface="Kalinga"/>
-        <a4:font xmlns:a4="http://schemas.openxmlformats.org/drawingml/2006/main" script="Jpan" typeface="ＭＳ Ｐゴシック"/>
-        <a4:font xmlns:a4="http://schemas.openxmlformats.org/drawingml/2006/main" script="Guru" typeface="Raavi"/>
-        <a4:font xmlns:a4="http://schemas.openxmlformats.org/drawingml/2006/main" script="Uigh" typeface="Microsoft Uighur"/>
-        <a4:font xmlns:a4="http://schemas.openxmlformats.org/drawingml/2006/main" script="Gujr" typeface="Shruti"/>
-        <a4:font xmlns:a4="http://schemas.openxmlformats.org/drawingml/2006/main" script="Beng" typeface="Vrinda"/>
-        <a4:font xmlns:a4="http://schemas.openxmlformats.org/drawingml/2006/main" script="Yiii" typeface="Microsoft Yi Baiti"/>
-        <a4:font xmlns:a4="http://schemas.openxmlformats.org/drawingml/2006/main" script="Thaa" typeface="MV Boli"/>
-        <a4:font xmlns:a4="http://schemas.openxmlformats.org/drawingml/2006/main" script="Khmr" typeface="MoolBoran"/>
-        <a4:font xmlns:a4="http://schemas.openxmlformats.org/drawingml/2006/main" script="Taml" typeface="Latha"/>
-        <a4:font xmlns:a4="http://schemas.openxmlformats.org/drawingml/2006/main" script="Cans" typeface="Euphemia"/>
-        <a4:font xmlns:a4="http://schemas.openxmlformats.org/drawingml/2006/main" script="Telu" typeface="Gautami"/>
-        <a4:font xmlns:a4="http://schemas.openxmlformats.org/drawingml/2006/main" script="Laoo" typeface="DokChampa"/>
-        <a4:font xmlns:a4="http://schemas.openxmlformats.org/drawingml/2006/main" script="Deva" typeface="Mangal"/>
-        <a4:font xmlns:a4="http://schemas.openxmlformats.org/drawingml/2006/main" script="Knda" typeface="Tunga"/>
-        <a4:font xmlns:a4="http://schemas.openxmlformats.org/drawingml/2006/main" script="Cher" typeface="Plantagenet Cherokee"/>
-        <a4:font xmlns:a4="http://schemas.openxmlformats.org/drawingml/2006/main" script="Arab" typeface="Times New Roman"/>
-        <a4:font xmlns:a4="http://schemas.openxmlformats.org/drawingml/2006/main" script="Mlym" typeface="Kartika"/>
-        <a4:font xmlns:a4="http://schemas.openxmlformats.org/drawingml/2006/main" script="Thai" typeface="Angsana New"/>
-        <a4:font xmlns:a4="http://schemas.openxmlformats.org/drawingml/2006/main" script="Ethi" typeface="Nyala"/>
-        <a4:font xmlns:a4="http://schemas.openxmlformats.org/drawingml/2006/main" script="Hebr" typeface="Times New Roman"/>
-        <a4:font xmlns:a4="http://schemas.openxmlformats.org/drawingml/2006/main" script="Sinh" typeface="Iskoola Pota"/>
-        <a4:font xmlns:a4="http://schemas.openxmlformats.org/drawingml/2006/main" script="Tibt" typeface="Microsoft Himalaya"/>
-        <a4:font xmlns:a4="http://schemas.openxmlformats.org/drawingml/2006/main" script="Mong" typeface="Mongolian Baiti"/>
-        <a4:font xmlns:a4="http://schemas.openxmlformats.org/drawingml/2006/main" script="Hang" typeface="맑은 고딕"/>
-        <a4:font xmlns:a4="http://schemas.openxmlformats.org/drawingml/2006/main" script="Viet" typeface="Times New Roman"/>
-        <a4:font xmlns:a4="http://schemas.openxmlformats.org/drawingml/2006/main" script="Hans" typeface="宋体"/>
-        <a4:font xmlns:a4="http://schemas.openxmlformats.org/drawingml/2006/main" script="Hant" typeface="新細明體"/>
       </a3:majorFont>
       <a3:minorFont xmlns:a3="http://schemas.openxmlformats.org/drawingml/2006/main">
-        <a4:latin xmlns:a4="http://schemas.openxmlformats.org/drawingml/2006/main" typeface="Calibri"/>
+        <a4:latin xmlns:a4="http://schemas.openxmlformats.org/drawingml/2006/main" typeface="Adobe Clean"/>
         <a4:ea xmlns:a4="http://schemas.openxmlformats.org/drawingml/2006/main" typeface=""/>
         <a4:cs xmlns:a4="http://schemas.openxmlformats.org/drawingml/2006/main" typeface=""/>
-        <a4:font xmlns:a4="http://schemas.openxmlformats.org/drawingml/2006/main" script="Syrc" typeface="Estrangelo Edessa"/>
-        <a4:font xmlns:a4="http://schemas.openxmlformats.org/drawingml/2006/main" script="Orya" typeface="Kalinga"/>
-        <a4:font xmlns:a4="http://schemas.openxmlformats.org/drawingml/2006/main" script="Jpan" typeface="ＭＳ Ｐゴシック"/>
-        <a4:font xmlns:a4="http://schemas.openxmlformats.org/drawingml/2006/main" script="Guru" typeface="Raavi"/>
-        <a4:font xmlns:a4="http://schemas.openxmlformats.org/drawingml/2006/main" script="Uigh" typeface="Microsoft Uighur"/>
-        <a4:font xmlns:a4="http://schemas.openxmlformats.org/drawingml/2006/main" script="Gujr" typeface="Shruti"/>
-        <a4:font xmlns:a4="http://schemas.openxmlformats.org/drawingml/2006/main" script="Beng" typeface="Vrinda"/>
-        <a4:font xmlns:a4="http://schemas.openxmlformats.org/drawingml/2006/main" script="Yiii" typeface="Microsoft Yi Baiti"/>
-        <a4:font xmlns:a4="http://schemas.openxmlformats.org/drawingml/2006/main" script="Thaa" typeface="MV Boli"/>
-        <a4:font xmlns:a4="http://schemas.openxmlformats.org/drawingml/2006/main" script="Khmr" typeface="DaunPenh"/>
-        <a4:font xmlns:a4="http://schemas.openxmlformats.org/drawingml/2006/main" script="Taml" typeface="Latha"/>
-        <a4:font xmlns:a4="http://schemas.openxmlformats.org/drawingml/2006/main" script="Cans" typeface="Euphemia"/>
-        <a4:font xmlns:a4="http://schemas.openxmlformats.org/drawingml/2006/main" script="Telu" typeface="Gautami"/>
-        <a4:font xmlns:a4="http://schemas.openxmlformats.org/drawingml/2006/main" script="Laoo" typeface="DokChampa"/>
-        <a4:font xmlns:a4="http://schemas.openxmlformats.org/drawingml/2006/main" script="Deva" typeface="Mangal"/>
-        <a4:font xmlns:a4="http://schemas.openxmlformats.org/drawingml/2006/main" script="Knda" typeface="Tunga"/>
-        <a4:font xmlns:a4="http://schemas.openxmlformats.org/drawingml/2006/main" script="Cher" typeface="Plantagenet Cherokee"/>
-        <a4:font xmlns:a4="http://schemas.openxmlformats.org/drawingml/2006/main" script="Arab" typeface="Arial"/>
-        <a4:font xmlns:a4="http://schemas.openxmlformats.org/drawingml/2006/main" script="Mlym" typeface="Kartika"/>
-        <a4:font xmlns:a4="http://schemas.openxmlformats.org/drawingml/2006/main" script="Thai" typeface="Cordia New"/>
-        <a4:font xmlns:a4="http://schemas.openxmlformats.org/drawingml/2006/main" script="Ethi" typeface="Nyala"/>
-        <a4:font xmlns:a4="http://schemas.openxmlformats.org/drawingml/2006/main" script="Hebr" typeface="Arial"/>
-        <a4:font xmlns:a4="http://schemas.openxmlformats.org/drawingml/2006/main" script="Sinh" typeface="Iskoola Pota"/>
-        <a4:font xmlns:a4="http://schemas.openxmlformats.org/drawingml/2006/main" script="Tibt" typeface="Microsoft Himalaya"/>
-        <a4:font xmlns:a4="http://schemas.openxmlformats.org/drawingml/2006/main" script="Mong" typeface="Mongolian Baiti"/>
-        <a4:font xmlns:a4="http://schemas.openxmlformats.org/drawingml/2006/main" script="Hang" typeface="맑은 고딕"/>
-        <a4:font xmlns:a4="http://schemas.openxmlformats.org/drawingml/2006/main" script="Viet" typeface="Arial"/>
-        <a4:font xmlns:a4="http://schemas.openxmlformats.org/drawingml/2006/main" script="Hans" typeface="宋体"/>
-        <a4:font xmlns:a4="http://schemas.openxmlformats.org/drawingml/2006/main" script="Hant" typeface="新細明體"/>
       </a3:minorFont>
     </a2:fontScheme>
-    <a2:fmtScheme xmlns:a2="http://schemas.openxmlformats.org/drawingml/2006/main" name="Office">
+    <a2:fmtScheme xmlns:a2="http://schemas.openxmlformats.org/drawingml/2006/main" name="Trek">
       <a3:fillStyleLst xmlns:a3="http://schemas.openxmlformats.org/drawingml/2006/main">
         <a4:solidFill xmlns:a4="http://schemas.openxmlformats.org/drawingml/2006/main">
           <a5:schemeClr xmlns:a5="http://schemas.openxmlformats.org/drawingml/2006/main" val="phClr"/>
@@ -41102,58 +41066,79 @@
           <a5:gsLst xmlns:a5="http://schemas.openxmlformats.org/drawingml/2006/main">
             <a6:gs xmlns:a6="http://schemas.openxmlformats.org/drawingml/2006/main" pos="0">
               <a7:schemeClr xmlns:a7="http://schemas.openxmlformats.org/drawingml/2006/main" val="phClr">
-                <a8:tint xmlns:a8="http://schemas.openxmlformats.org/drawingml/2006/main" val="50000"/>
-                <a8:satMod xmlns:a8="http://schemas.openxmlformats.org/drawingml/2006/main" val="300000"/>
+                <a8:tint xmlns:a8="http://schemas.openxmlformats.org/drawingml/2006/main" val="30000"/>
+                <a8:satMod xmlns:a8="http://schemas.openxmlformats.org/drawingml/2006/main" val="250000"/>
               </a7:schemeClr>
             </a6:gs>
-            <a6:gs xmlns:a6="http://schemas.openxmlformats.org/drawingml/2006/main" pos="35000">
+            <a6:gs xmlns:a6="http://schemas.openxmlformats.org/drawingml/2006/main" pos="72000">
               <a7:schemeClr xmlns:a7="http://schemas.openxmlformats.org/drawingml/2006/main" val="phClr">
-                <a8:tint xmlns:a8="http://schemas.openxmlformats.org/drawingml/2006/main" val="37000"/>
-                <a8:satMod xmlns:a8="http://schemas.openxmlformats.org/drawingml/2006/main" val="300000"/>
+                <a8:tint xmlns:a8="http://schemas.openxmlformats.org/drawingml/2006/main" val="75000"/>
+                <a8:satMod xmlns:a8="http://schemas.openxmlformats.org/drawingml/2006/main" val="210000"/>
               </a7:schemeClr>
             </a6:gs>
             <a6:gs xmlns:a6="http://schemas.openxmlformats.org/drawingml/2006/main" pos="100000">
               <a7:schemeClr xmlns:a7="http://schemas.openxmlformats.org/drawingml/2006/main" val="phClr">
-                <a8:tint xmlns:a8="http://schemas.openxmlformats.org/drawingml/2006/main" val="15000"/>
-                <a8:satMod xmlns:a8="http://schemas.openxmlformats.org/drawingml/2006/main" val="350000"/>
+                <a8:tint xmlns:a8="http://schemas.openxmlformats.org/drawingml/2006/main" val="85000"/>
+                <a8:satMod xmlns:a8="http://schemas.openxmlformats.org/drawingml/2006/main" val="210000"/>
               </a7:schemeClr>
             </a6:gs>
           </a5:gsLst>
-          <a5:lin xmlns:a5="http://schemas.openxmlformats.org/drawingml/2006/main" ang="16200000" scaled="1"/>
+          <a5:lin xmlns:a5="http://schemas.openxmlformats.org/drawingml/2006/main" ang="5400000" scaled="1"/>
           <a5:tileRect xmlns:a5="http://schemas.openxmlformats.org/drawingml/2006/main"/>
         </a4:gradFill>
         <a4:gradFill xmlns:a4="http://schemas.openxmlformats.org/drawingml/2006/main" rotWithShape="1">
           <a5:gsLst xmlns:a5="http://schemas.openxmlformats.org/drawingml/2006/main">
             <a6:gs xmlns:a6="http://schemas.openxmlformats.org/drawingml/2006/main" pos="0">
               <a7:schemeClr xmlns:a7="http://schemas.openxmlformats.org/drawingml/2006/main" val="phClr">
-                <a8:shade xmlns:a8="http://schemas.openxmlformats.org/drawingml/2006/main" val="51000"/>
-                <a8:satMod xmlns:a8="http://schemas.openxmlformats.org/drawingml/2006/main" val="130000"/>
+                <a8:tint xmlns:a8="http://schemas.openxmlformats.org/drawingml/2006/main" val="75000"/>
+                <a8:shade xmlns:a8="http://schemas.openxmlformats.org/drawingml/2006/main" val="85000"/>
+                <a8:satMod xmlns:a8="http://schemas.openxmlformats.org/drawingml/2006/main" val="230000"/>
+              </a7:schemeClr>
+            </a6:gs>
+            <a6:gs xmlns:a6="http://schemas.openxmlformats.org/drawingml/2006/main" pos="25000">
+              <a7:schemeClr xmlns:a7="http://schemas.openxmlformats.org/drawingml/2006/main" val="phClr">
+                <a8:tint xmlns:a8="http://schemas.openxmlformats.org/drawingml/2006/main" val="90000"/>
+                <a8:shade xmlns:a8="http://schemas.openxmlformats.org/drawingml/2006/main" val="70000"/>
+                <a8:satMod xmlns:a8="http://schemas.openxmlformats.org/drawingml/2006/main" val="220000"/>
+              </a7:schemeClr>
+            </a6:gs>
+            <a6:gs xmlns:a6="http://schemas.openxmlformats.org/drawingml/2006/main" pos="50000">
+              <a7:schemeClr xmlns:a7="http://schemas.openxmlformats.org/drawingml/2006/main" val="phClr">
+                <a8:tint xmlns:a8="http://schemas.openxmlformats.org/drawingml/2006/main" val="90000"/>
+                <a8:shade xmlns:a8="http://schemas.openxmlformats.org/drawingml/2006/main" val="58000"/>
+                <a8:satMod xmlns:a8="http://schemas.openxmlformats.org/drawingml/2006/main" val="225000"/>
+              </a7:schemeClr>
+            </a6:gs>
+            <a6:gs xmlns:a6="http://schemas.openxmlformats.org/drawingml/2006/main" pos="65000">
+              <a7:schemeClr xmlns:a7="http://schemas.openxmlformats.org/drawingml/2006/main" val="phClr">
+                <a8:tint xmlns:a8="http://schemas.openxmlformats.org/drawingml/2006/main" val="90000"/>
+                <a8:shade xmlns:a8="http://schemas.openxmlformats.org/drawingml/2006/main" val="58000"/>
+                <a8:satMod xmlns:a8="http://schemas.openxmlformats.org/drawingml/2006/main" val="225000"/>
               </a7:schemeClr>
             </a6:gs>
             <a6:gs xmlns:a6="http://schemas.openxmlformats.org/drawingml/2006/main" pos="80000">
               <a7:schemeClr xmlns:a7="http://schemas.openxmlformats.org/drawingml/2006/main" val="phClr">
-                <a8:shade xmlns:a8="http://schemas.openxmlformats.org/drawingml/2006/main" val="93000"/>
-                <a8:satMod xmlns:a8="http://schemas.openxmlformats.org/drawingml/2006/main" val="130000"/>
+                <a8:tint xmlns:a8="http://schemas.openxmlformats.org/drawingml/2006/main" val="90000"/>
+                <a8:shade xmlns:a8="http://schemas.openxmlformats.org/drawingml/2006/main" val="69000"/>
+                <a8:satMod xmlns:a8="http://schemas.openxmlformats.org/drawingml/2006/main" val="220000"/>
               </a7:schemeClr>
             </a6:gs>
             <a6:gs xmlns:a6="http://schemas.openxmlformats.org/drawingml/2006/main" pos="100000">
               <a7:schemeClr xmlns:a7="http://schemas.openxmlformats.org/drawingml/2006/main" val="phClr">
-                <a8:shade xmlns:a8="http://schemas.openxmlformats.org/drawingml/2006/main" val="94000"/>
-                <a8:satMod xmlns:a8="http://schemas.openxmlformats.org/drawingml/2006/main" val="135000"/>
+                <a8:tint xmlns:a8="http://schemas.openxmlformats.org/drawingml/2006/main" val="77000"/>
+                <a8:shade xmlns:a8="http://schemas.openxmlformats.org/drawingml/2006/main" val="80000"/>
+                <a8:satMod xmlns:a8="http://schemas.openxmlformats.org/drawingml/2006/main" val="230000"/>
               </a7:schemeClr>
             </a6:gs>
           </a5:gsLst>
-          <a5:lin xmlns:a5="http://schemas.openxmlformats.org/drawingml/2006/main" ang="16200000" scaled="0"/>
+          <a5:lin xmlns:a5="http://schemas.openxmlformats.org/drawingml/2006/main" ang="5400000" scaled="1"/>
           <a5:tileRect xmlns:a5="http://schemas.openxmlformats.org/drawingml/2006/main"/>
         </a4:gradFill>
       </a3:fillStyleLst>
       <a3:lnStyleLst xmlns:a3="http://schemas.openxmlformats.org/drawingml/2006/main">
-        <a4:ln xmlns:a4="http://schemas.openxmlformats.org/drawingml/2006/main" w="9525" cap="flat" cmpd="sng" algn="ctr">
+        <a4:ln xmlns:a4="http://schemas.openxmlformats.org/drawingml/2006/main" w="10000" cap="flat" cmpd="sng" algn="ctr">
           <solidFill xmlns="http://schemas.openxmlformats.org/drawingml/2006/main">
-            <a5:schemeClr xmlns:a5="http://schemas.openxmlformats.org/drawingml/2006/main" val="phClr">
-              <a6:shade xmlns:a6="http://schemas.openxmlformats.org/drawingml/2006/main" val="95000"/>
-              <a6:satMod xmlns:a6="http://schemas.openxmlformats.org/drawingml/2006/main" val="105000"/>
-            </a5:schemeClr>
+            <a5:schemeClr xmlns:a5="http://schemas.openxmlformats.org/drawingml/2006/main" val="phClr"/>
           </solidFill>
           <a5:prstDash xmlns:a5="http://schemas.openxmlformats.org/drawingml/2006/main" val="solid"/>
         </a4:ln>
@@ -41173,27 +41158,18 @@
       <a3:effectStyleLst xmlns:a3="http://schemas.openxmlformats.org/drawingml/2006/main">
         <a4:effectStyle xmlns:a4="http://schemas.openxmlformats.org/drawingml/2006/main">
           <a5:effectLst xmlns:a5="http://schemas.openxmlformats.org/drawingml/2006/main">
-            <a6:outerShdw xmlns:a6="http://schemas.openxmlformats.org/drawingml/2006/main" blurRad="40000" dir="5400000" dist="20000" rotWithShape="0">
-              <a7:srgbClr xmlns:a7="http://schemas.openxmlformats.org/drawingml/2006/main" val="000000">
-                <a8:alpha xmlns:a8="http://schemas.openxmlformats.org/drawingml/2006/main" val="38000"/>
+            <a6:outerShdw xmlns:a6="http://schemas.openxmlformats.org/drawingml/2006/main" blurRad="76200" dir="5400000" dist="50800" rotWithShape="0">
+              <a7:srgbClr xmlns:a7="http://schemas.openxmlformats.org/drawingml/2006/main" val="4E3B30">
+                <a8:alpha xmlns:a8="http://schemas.openxmlformats.org/drawingml/2006/main" val="60000"/>
               </a7:srgbClr>
             </a6:outerShdw>
           </a5:effectLst>
         </a4:effectStyle>
         <a4:effectStyle xmlns:a4="http://schemas.openxmlformats.org/drawingml/2006/main">
           <a5:effectLst xmlns:a5="http://schemas.openxmlformats.org/drawingml/2006/main">
-            <a6:outerShdw xmlns:a6="http://schemas.openxmlformats.org/drawingml/2006/main" blurRad="40000" dir="5400000" dist="23000" rotWithShape="0">
-              <a7:srgbClr xmlns:a7="http://schemas.openxmlformats.org/drawingml/2006/main" val="000000">
-                <a8:alpha xmlns:a8="http://schemas.openxmlformats.org/drawingml/2006/main" val="35000"/>
-              </a7:srgbClr>
-            </a6:outerShdw>
-          </a5:effectLst>
-        </a4:effectStyle>
-        <a4:effectStyle xmlns:a4="http://schemas.openxmlformats.org/drawingml/2006/main">
-          <a5:effectLst xmlns:a5="http://schemas.openxmlformats.org/drawingml/2006/main">
-            <a6:outerShdw xmlns:a6="http://schemas.openxmlformats.org/drawingml/2006/main" blurRad="40000" dir="5400000" dist="23000" rotWithShape="0">
-              <a7:srgbClr xmlns:a7="http://schemas.openxmlformats.org/drawingml/2006/main" val="000000">
-                <a8:alpha xmlns:a8="http://schemas.openxmlformats.org/drawingml/2006/main" val="35000"/>
+            <a6:outerShdw xmlns:a6="http://schemas.openxmlformats.org/drawingml/2006/main" blurRad="76200" dir="5400000" dist="50800" rotWithShape="0">
+              <a7:srgbClr xmlns:a7="http://schemas.openxmlformats.org/drawingml/2006/main" val="4E3B30">
+                <a8:alpha xmlns:a8="http://schemas.openxmlformats.org/drawingml/2006/main" val="60000"/>
               </a7:srgbClr>
             </a6:outerShdw>
           </a5:effectLst>
@@ -41201,12 +41177,36 @@
             <a6:camera xmlns:a6="http://schemas.openxmlformats.org/drawingml/2006/main" prst="orthographicFront">
               <a7:rot xmlns:a7="http://schemas.openxmlformats.org/drawingml/2006/main" lat="0" lon="0" rev="0"/>
             </a6:camera>
-            <a6:lightRig xmlns:a6="http://schemas.openxmlformats.org/drawingml/2006/main" dir="t" rig="threePt">
-              <a7:rot xmlns:a7="http://schemas.openxmlformats.org/drawingml/2006/main" lat="0" lon="0" rev="1200000"/>
+            <a6:lightRig xmlns:a6="http://schemas.openxmlformats.org/drawingml/2006/main" dir="tl" rig="threePt"/>
+          </a5:scene3d>
+          <a5:sp3d xmlns:a5="http://schemas.openxmlformats.org/drawingml/2006/main" prstMaterial="metal">
+            <a6:bevelT xmlns:a6="http://schemas.openxmlformats.org/drawingml/2006/main" w="10000" h="10000" prst="circle"/>
+          </a5:sp3d>
+        </a4:effectStyle>
+        <a4:effectStyle xmlns:a4="http://schemas.openxmlformats.org/drawingml/2006/main">
+          <a5:effectLst xmlns:a5="http://schemas.openxmlformats.org/drawingml/2006/main">
+            <a6:outerShdw xmlns:a6="http://schemas.openxmlformats.org/drawingml/2006/main" blurRad="76200" dir="5400000" dist="50800" rotWithShape="0">
+              <a7:srgbClr xmlns:a7="http://schemas.openxmlformats.org/drawingml/2006/main" val="4E3B30">
+                <a8:alpha xmlns:a8="http://schemas.openxmlformats.org/drawingml/2006/main" val="60000"/>
+              </a7:srgbClr>
+            </a6:outerShdw>
+          </a5:effectLst>
+          <a5:scene3d xmlns:a5="http://schemas.openxmlformats.org/drawingml/2006/main">
+            <a6:camera xmlns:a6="http://schemas.openxmlformats.org/drawingml/2006/main" prst="obliqueTopLeft" fov="600000">
+              <a7:rot xmlns:a7="http://schemas.openxmlformats.org/drawingml/2006/main" lat="0" lon="0" rev="0"/>
+            </a6:camera>
+            <a6:lightRig xmlns:a6="http://schemas.openxmlformats.org/drawingml/2006/main" dir="t" rig="balanced">
+              <a7:rot xmlns:a7="http://schemas.openxmlformats.org/drawingml/2006/main" lat="0" lon="0" rev="19200000"/>
             </a6:lightRig>
           </a5:scene3d>
-          <a5:sp3d xmlns:a5="http://schemas.openxmlformats.org/drawingml/2006/main">
-            <a6:bevelT xmlns:a6="http://schemas.openxmlformats.org/drawingml/2006/main" w="63500" h="25400" prst="circle"/>
+          <a5:sp3d xmlns:a5="http://schemas.openxmlformats.org/drawingml/2006/main" contourW="12700" prstMaterial="matte">
+            <a6:bevelT xmlns:a6="http://schemas.openxmlformats.org/drawingml/2006/main" w="60000" h="50800" prst="circle"/>
+            <a6:contourClr xmlns:a6="http://schemas.openxmlformats.org/drawingml/2006/main">
+              <a7:schemeClr xmlns:a7="http://schemas.openxmlformats.org/drawingml/2006/main" val="phClr">
+                <a8:shade xmlns:a8="http://schemas.openxmlformats.org/drawingml/2006/main" val="60000"/>
+                <a8:satMod xmlns:a8="http://schemas.openxmlformats.org/drawingml/2006/main" val="110000"/>
+              </a7:schemeClr>
+            </a6:contourClr>
           </a5:sp3d>
         </a4:effectStyle>
       </a3:effectStyleLst>

</xml_diff>